<commit_message>
run hungarian algorithm again
use bad point to calculate the new cost
</commit_message>
<xml_diff>
--- a/Jay_TPS/shape_context_ransac/shape_context_ransac.pptx
+++ b/Jay_TPS/shape_context_ransac/shape_context_ransac.pptx
@@ -44,6 +44,25 @@
     <p:sldId id="292" r:id="rId38"/>
     <p:sldId id="293" r:id="rId39"/>
     <p:sldId id="294" r:id="rId40"/>
+    <p:sldId id="295" r:id="rId41"/>
+    <p:sldId id="296" r:id="rId42"/>
+    <p:sldId id="297" r:id="rId43"/>
+    <p:sldId id="298" r:id="rId44"/>
+    <p:sldId id="299" r:id="rId45"/>
+    <p:sldId id="306" r:id="rId46"/>
+    <p:sldId id="300" r:id="rId47"/>
+    <p:sldId id="301" r:id="rId48"/>
+    <p:sldId id="302" r:id="rId49"/>
+    <p:sldId id="303" r:id="rId50"/>
+    <p:sldId id="304" r:id="rId51"/>
+    <p:sldId id="305" r:id="rId52"/>
+    <p:sldId id="307" r:id="rId53"/>
+    <p:sldId id="310" r:id="rId54"/>
+    <p:sldId id="309" r:id="rId55"/>
+    <p:sldId id="308" r:id="rId56"/>
+    <p:sldId id="311" r:id="rId57"/>
+    <p:sldId id="312" r:id="rId58"/>
+    <p:sldId id="313" r:id="rId59"/>
   </p:sldIdLst>
   <p:sldSz cx="12192000" cy="6858000"/>
   <p:notesSz cx="6858000" cy="9144000"/>
@@ -281,7 +300,7 @@
           <a:p>
             <a:fld id="{3B68CFFC-CE74-4479-8AE7-587352A62002}" type="datetimeFigureOut">
               <a:rPr lang="zh-TW" altLang="en-US" smtClean="0"/>
-              <a:t>2015/6/5</a:t>
+              <a:t>2015/6/12</a:t>
             </a:fld>
             <a:endParaRPr lang="zh-TW" altLang="en-US"/>
           </a:p>
@@ -451,7 +470,7 @@
           <a:p>
             <a:fld id="{3B68CFFC-CE74-4479-8AE7-587352A62002}" type="datetimeFigureOut">
               <a:rPr lang="zh-TW" altLang="en-US" smtClean="0"/>
-              <a:t>2015/6/5</a:t>
+              <a:t>2015/6/12</a:t>
             </a:fld>
             <a:endParaRPr lang="zh-TW" altLang="en-US"/>
           </a:p>
@@ -631,7 +650,7 @@
           <a:p>
             <a:fld id="{3B68CFFC-CE74-4479-8AE7-587352A62002}" type="datetimeFigureOut">
               <a:rPr lang="zh-TW" altLang="en-US" smtClean="0"/>
-              <a:t>2015/6/5</a:t>
+              <a:t>2015/6/12</a:t>
             </a:fld>
             <a:endParaRPr lang="zh-TW" altLang="en-US"/>
           </a:p>
@@ -801,7 +820,7 @@
           <a:p>
             <a:fld id="{3B68CFFC-CE74-4479-8AE7-587352A62002}" type="datetimeFigureOut">
               <a:rPr lang="zh-TW" altLang="en-US" smtClean="0"/>
-              <a:t>2015/6/5</a:t>
+              <a:t>2015/6/12</a:t>
             </a:fld>
             <a:endParaRPr lang="zh-TW" altLang="en-US"/>
           </a:p>
@@ -1047,7 +1066,7 @@
           <a:p>
             <a:fld id="{3B68CFFC-CE74-4479-8AE7-587352A62002}" type="datetimeFigureOut">
               <a:rPr lang="zh-TW" altLang="en-US" smtClean="0"/>
-              <a:t>2015/6/5</a:t>
+              <a:t>2015/6/12</a:t>
             </a:fld>
             <a:endParaRPr lang="zh-TW" altLang="en-US"/>
           </a:p>
@@ -1279,7 +1298,7 @@
           <a:p>
             <a:fld id="{3B68CFFC-CE74-4479-8AE7-587352A62002}" type="datetimeFigureOut">
               <a:rPr lang="zh-TW" altLang="en-US" smtClean="0"/>
-              <a:t>2015/6/5</a:t>
+              <a:t>2015/6/12</a:t>
             </a:fld>
             <a:endParaRPr lang="zh-TW" altLang="en-US"/>
           </a:p>
@@ -1646,7 +1665,7 @@
           <a:p>
             <a:fld id="{3B68CFFC-CE74-4479-8AE7-587352A62002}" type="datetimeFigureOut">
               <a:rPr lang="zh-TW" altLang="en-US" smtClean="0"/>
-              <a:t>2015/6/5</a:t>
+              <a:t>2015/6/12</a:t>
             </a:fld>
             <a:endParaRPr lang="zh-TW" altLang="en-US"/>
           </a:p>
@@ -1764,7 +1783,7 @@
           <a:p>
             <a:fld id="{3B68CFFC-CE74-4479-8AE7-587352A62002}" type="datetimeFigureOut">
               <a:rPr lang="zh-TW" altLang="en-US" smtClean="0"/>
-              <a:t>2015/6/5</a:t>
+              <a:t>2015/6/12</a:t>
             </a:fld>
             <a:endParaRPr lang="zh-TW" altLang="en-US"/>
           </a:p>
@@ -1859,7 +1878,7 @@
           <a:p>
             <a:fld id="{3B68CFFC-CE74-4479-8AE7-587352A62002}" type="datetimeFigureOut">
               <a:rPr lang="zh-TW" altLang="en-US" smtClean="0"/>
-              <a:t>2015/6/5</a:t>
+              <a:t>2015/6/12</a:t>
             </a:fld>
             <a:endParaRPr lang="zh-TW" altLang="en-US"/>
           </a:p>
@@ -2136,7 +2155,7 @@
           <a:p>
             <a:fld id="{3B68CFFC-CE74-4479-8AE7-587352A62002}" type="datetimeFigureOut">
               <a:rPr lang="zh-TW" altLang="en-US" smtClean="0"/>
-              <a:t>2015/6/5</a:t>
+              <a:t>2015/6/12</a:t>
             </a:fld>
             <a:endParaRPr lang="zh-TW" altLang="en-US"/>
           </a:p>
@@ -2389,7 +2408,7 @@
           <a:p>
             <a:fld id="{3B68CFFC-CE74-4479-8AE7-587352A62002}" type="datetimeFigureOut">
               <a:rPr lang="zh-TW" altLang="en-US" smtClean="0"/>
-              <a:t>2015/6/5</a:t>
+              <a:t>2015/6/12</a:t>
             </a:fld>
             <a:endParaRPr lang="zh-TW" altLang="en-US"/>
           </a:p>
@@ -2602,7 +2621,7 @@
           <a:p>
             <a:fld id="{3B68CFFC-CE74-4479-8AE7-587352A62002}" type="datetimeFigureOut">
               <a:rPr lang="zh-TW" altLang="en-US" smtClean="0"/>
-              <a:t>2015/6/5</a:t>
+              <a:t>2015/6/12</a:t>
             </a:fld>
             <a:endParaRPr lang="zh-TW" altLang="en-US"/>
           </a:p>
@@ -8290,6 +8309,1814 @@
 </p:sld>
 </file>
 
+<file path=ppt/slides/slide40.xml><?xml version="1.0" encoding="utf-8"?>
+<p:sld xmlns:a="http://schemas.openxmlformats.org/drawingml/2006/main" xmlns:r="http://schemas.openxmlformats.org/officeDocument/2006/relationships" xmlns:p="http://schemas.openxmlformats.org/presentationml/2006/main">
+  <p:cSld>
+    <p:spTree>
+      <p:nvGrpSpPr>
+        <p:cNvPr id="1" name=""/>
+        <p:cNvGrpSpPr/>
+        <p:nvPr/>
+      </p:nvGrpSpPr>
+      <p:grpSpPr>
+        <a:xfrm>
+          <a:off x="0" y="0"/>
+          <a:ext cx="0" cy="0"/>
+          <a:chOff x="0" y="0"/>
+          <a:chExt cx="0" cy="0"/>
+        </a:xfrm>
+      </p:grpSpPr>
+      <p:sp>
+        <p:nvSpPr>
+          <p:cNvPr id="2" name="標題 1"/>
+          <p:cNvSpPr>
+            <a:spLocks noGrp="1"/>
+          </p:cNvSpPr>
+          <p:nvPr>
+            <p:ph type="ctrTitle"/>
+          </p:nvPr>
+        </p:nvSpPr>
+        <p:spPr>
+          <a:xfrm>
+            <a:off x="1078173" y="1122363"/>
+            <a:ext cx="10167581" cy="2387600"/>
+          </a:xfrm>
+        </p:spPr>
+        <p:txBody>
+          <a:bodyPr/>
+          <a:lstStyle/>
+          <a:p>
+            <a:r>
+              <a:rPr lang="en-US" altLang="zh-TW" dirty="0" smtClean="0"/>
+              <a:t>Apply RANSAC in Shape Context</a:t>
+            </a:r>
+            <a:endParaRPr lang="zh-TW" altLang="en-US" dirty="0"/>
+          </a:p>
+        </p:txBody>
+      </p:sp>
+      <p:sp>
+        <p:nvSpPr>
+          <p:cNvPr id="3" name="副標題 2"/>
+          <p:cNvSpPr>
+            <a:spLocks noGrp="1"/>
+          </p:cNvSpPr>
+          <p:nvPr>
+            <p:ph type="subTitle" idx="1"/>
+          </p:nvPr>
+        </p:nvSpPr>
+        <p:spPr>
+          <a:xfrm>
+            <a:off x="1524000" y="3602037"/>
+            <a:ext cx="9144000" cy="2484863"/>
+          </a:xfrm>
+        </p:spPr>
+        <p:txBody>
+          <a:bodyPr>
+            <a:normAutofit lnSpcReduction="10000"/>
+          </a:bodyPr>
+          <a:lstStyle/>
+          <a:p>
+            <a:r>
+              <a:rPr lang="en-US" altLang="zh-TW" dirty="0" smtClean="0"/>
+              <a:t>(1)</a:t>
+            </a:r>
+            <a:r>
+              <a:rPr lang="zh-TW" altLang="en-US" dirty="0" smtClean="0"/>
+              <a:t>轉換矩陣只做一次</a:t>
+            </a:r>
+            <a:endParaRPr lang="en-US" altLang="zh-TW" dirty="0" smtClean="0"/>
+          </a:p>
+          <a:p>
+            <a:r>
+              <a:rPr lang="en-US" altLang="zh-TW" dirty="0" smtClean="0"/>
+              <a:t>(2)Voting</a:t>
+            </a:r>
+            <a:r>
+              <a:rPr lang="zh-TW" altLang="en-US" dirty="0" smtClean="0"/>
+              <a:t>後看對的多少錯的多少，</a:t>
+            </a:r>
+            <a:r>
+              <a:rPr lang="en-US" altLang="zh-TW" dirty="0" smtClean="0"/>
+              <a:t>show</a:t>
+            </a:r>
+            <a:r>
+              <a:rPr lang="zh-TW" altLang="en-US" dirty="0" smtClean="0"/>
+              <a:t>出來</a:t>
+            </a:r>
+            <a:endParaRPr lang="en-US" altLang="zh-TW" dirty="0" smtClean="0"/>
+          </a:p>
+          <a:p>
+            <a:r>
+              <a:rPr lang="en-US" altLang="zh-TW" dirty="0" smtClean="0"/>
+              <a:t>(3)</a:t>
+            </a:r>
+            <a:r>
+              <a:rPr lang="zh-TW" altLang="en-US" dirty="0" smtClean="0"/>
+              <a:t>把對的與錯的點存起來</a:t>
+            </a:r>
+            <a:endParaRPr lang="en-US" altLang="zh-TW" dirty="0" smtClean="0"/>
+          </a:p>
+          <a:p>
+            <a:r>
+              <a:rPr lang="en-US" altLang="zh-TW" dirty="0" smtClean="0"/>
+              <a:t>(4)</a:t>
+            </a:r>
+            <a:r>
+              <a:rPr lang="zh-TW" altLang="en-US" dirty="0" smtClean="0"/>
+              <a:t>再跑一次</a:t>
+            </a:r>
+            <a:r>
+              <a:rPr lang="en-US" altLang="zh-TW" dirty="0" smtClean="0"/>
+              <a:t>shape</a:t>
+            </a:r>
+            <a:r>
+              <a:rPr lang="zh-TW" altLang="en-US" dirty="0" smtClean="0"/>
+              <a:t> </a:t>
+            </a:r>
+            <a:r>
+              <a:rPr lang="en-US" altLang="zh-TW" dirty="0" smtClean="0"/>
+              <a:t>context</a:t>
+            </a:r>
+          </a:p>
+          <a:p>
+            <a:r>
+              <a:rPr lang="en-US" altLang="zh-TW" dirty="0" smtClean="0"/>
+              <a:t>(5)</a:t>
+            </a:r>
+            <a:r>
+              <a:rPr lang="zh-TW" altLang="en-US" dirty="0" smtClean="0"/>
+              <a:t>看改善了幾個點</a:t>
+            </a:r>
+            <a:endParaRPr lang="en-US" altLang="zh-TW" dirty="0" smtClean="0"/>
+          </a:p>
+          <a:p>
+            <a:r>
+              <a:rPr lang="zh-TW" altLang="en-US" dirty="0" smtClean="0"/>
+              <a:t>王泰傑</a:t>
+            </a:r>
+            <a:endParaRPr lang="zh-TW" altLang="en-US" dirty="0"/>
+          </a:p>
+        </p:txBody>
+      </p:sp>
+    </p:spTree>
+    <p:extLst>
+      <p:ext uri="{BB962C8B-B14F-4D97-AF65-F5344CB8AC3E}">
+        <p14:creationId xmlns:p14="http://schemas.microsoft.com/office/powerpoint/2010/main" val="3607037074"/>
+      </p:ext>
+    </p:extLst>
+  </p:cSld>
+  <p:clrMapOvr>
+    <a:masterClrMapping/>
+  </p:clrMapOvr>
+  <p:timing>
+    <p:tnLst>
+      <p:par>
+        <p:cTn id="1" dur="indefinite" restart="never" nodeType="tmRoot"/>
+      </p:par>
+    </p:tnLst>
+  </p:timing>
+</p:sld>
+</file>
+
+<file path=ppt/slides/slide41.xml><?xml version="1.0" encoding="utf-8"?>
+<p:sld xmlns:a="http://schemas.openxmlformats.org/drawingml/2006/main" xmlns:r="http://schemas.openxmlformats.org/officeDocument/2006/relationships" xmlns:p="http://schemas.openxmlformats.org/presentationml/2006/main">
+  <p:cSld>
+    <p:spTree>
+      <p:nvGrpSpPr>
+        <p:cNvPr id="1" name=""/>
+        <p:cNvGrpSpPr/>
+        <p:nvPr/>
+      </p:nvGrpSpPr>
+      <p:grpSpPr>
+        <a:xfrm>
+          <a:off x="0" y="0"/>
+          <a:ext cx="0" cy="0"/>
+          <a:chOff x="0" y="0"/>
+          <a:chExt cx="0" cy="0"/>
+        </a:xfrm>
+      </p:grpSpPr>
+      <p:pic>
+        <p:nvPicPr>
+          <p:cNvPr id="4" name="圖片 3"/>
+          <p:cNvPicPr>
+            <a:picLocks noChangeAspect="1"/>
+          </p:cNvPicPr>
+          <p:nvPr/>
+        </p:nvPicPr>
+        <p:blipFill>
+          <a:blip r:embed="rId2"/>
+          <a:stretch>
+            <a:fillRect/>
+          </a:stretch>
+        </p:blipFill>
+        <p:spPr>
+          <a:xfrm>
+            <a:off x="-158086" y="201352"/>
+            <a:ext cx="6482447" cy="5298696"/>
+          </a:xfrm>
+          <a:prstGeom prst="rect">
+            <a:avLst/>
+          </a:prstGeom>
+        </p:spPr>
+      </p:pic>
+      <p:sp>
+        <p:nvSpPr>
+          <p:cNvPr id="5" name="文字方塊 4"/>
+          <p:cNvSpPr txBox="1"/>
+          <p:nvPr/>
+        </p:nvSpPr>
+        <p:spPr>
+          <a:xfrm>
+            <a:off x="688053" y="1039847"/>
+            <a:ext cx="2668038" cy="369332"/>
+          </a:xfrm>
+          <a:prstGeom prst="rect">
+            <a:avLst/>
+          </a:prstGeom>
+          <a:noFill/>
+        </p:spPr>
+        <p:txBody>
+          <a:bodyPr wrap="none" rtlCol="0">
+            <a:spAutoFit/>
+          </a:bodyPr>
+          <a:lstStyle/>
+          <a:p>
+            <a:r>
+              <a:rPr lang="en-US" altLang="zh-TW" b="1" dirty="0" smtClean="0">
+                <a:solidFill>
+                  <a:srgbClr val="FF0000"/>
+                </a:solidFill>
+              </a:rPr>
+              <a:t>Shape</a:t>
+            </a:r>
+            <a:r>
+              <a:rPr lang="zh-TW" altLang="en-US" b="1" dirty="0" smtClean="0">
+                <a:solidFill>
+                  <a:srgbClr val="FF0000"/>
+                </a:solidFill>
+              </a:rPr>
+              <a:t> </a:t>
+            </a:r>
+            <a:r>
+              <a:rPr lang="en-US" altLang="zh-TW" b="1" dirty="0" smtClean="0">
+                <a:solidFill>
+                  <a:srgbClr val="FF0000"/>
+                </a:solidFill>
+              </a:rPr>
+              <a:t>context</a:t>
+            </a:r>
+            <a:r>
+              <a:rPr lang="zh-TW" altLang="en-US" b="1" dirty="0" smtClean="0">
+                <a:solidFill>
+                  <a:srgbClr val="FF0000"/>
+                </a:solidFill>
+              </a:rPr>
+              <a:t>做完第一次</a:t>
+            </a:r>
+            <a:endParaRPr lang="zh-TW" altLang="en-US" b="1" dirty="0">
+              <a:solidFill>
+                <a:srgbClr val="FF0000"/>
+              </a:solidFill>
+            </a:endParaRPr>
+          </a:p>
+        </p:txBody>
+      </p:sp>
+      <p:pic>
+        <p:nvPicPr>
+          <p:cNvPr id="8" name="圖片 7"/>
+          <p:cNvPicPr>
+            <a:picLocks noChangeAspect="1"/>
+          </p:cNvPicPr>
+          <p:nvPr/>
+        </p:nvPicPr>
+        <p:blipFill>
+          <a:blip r:embed="rId3"/>
+          <a:stretch>
+            <a:fillRect/>
+          </a:stretch>
+        </p:blipFill>
+        <p:spPr>
+          <a:xfrm>
+            <a:off x="7297200" y="201600"/>
+            <a:ext cx="4912043" cy="3994785"/>
+          </a:xfrm>
+          <a:prstGeom prst="rect">
+            <a:avLst/>
+          </a:prstGeom>
+        </p:spPr>
+      </p:pic>
+      <p:pic>
+        <p:nvPicPr>
+          <p:cNvPr id="9" name="圖片 8"/>
+          <p:cNvPicPr>
+            <a:picLocks noChangeAspect="1"/>
+          </p:cNvPicPr>
+          <p:nvPr/>
+        </p:nvPicPr>
+        <p:blipFill>
+          <a:blip r:embed="rId4"/>
+          <a:stretch>
+            <a:fillRect/>
+          </a:stretch>
+        </p:blipFill>
+        <p:spPr>
+          <a:xfrm>
+            <a:off x="5695200" y="3427200"/>
+            <a:ext cx="4335780" cy="3566160"/>
+          </a:xfrm>
+          <a:prstGeom prst="rect">
+            <a:avLst/>
+          </a:prstGeom>
+        </p:spPr>
+      </p:pic>
+    </p:spTree>
+    <p:extLst>
+      <p:ext uri="{BB962C8B-B14F-4D97-AF65-F5344CB8AC3E}">
+        <p14:creationId xmlns:p14="http://schemas.microsoft.com/office/powerpoint/2010/main" val="2808397691"/>
+      </p:ext>
+    </p:extLst>
+  </p:cSld>
+  <p:clrMapOvr>
+    <a:masterClrMapping/>
+  </p:clrMapOvr>
+  <p:timing>
+    <p:tnLst>
+      <p:par>
+        <p:cTn id="1" dur="indefinite" restart="never" nodeType="tmRoot"/>
+      </p:par>
+    </p:tnLst>
+  </p:timing>
+</p:sld>
+</file>
+
+<file path=ppt/slides/slide42.xml><?xml version="1.0" encoding="utf-8"?>
+<p:sld xmlns:a="http://schemas.openxmlformats.org/drawingml/2006/main" xmlns:r="http://schemas.openxmlformats.org/officeDocument/2006/relationships" xmlns:p="http://schemas.openxmlformats.org/presentationml/2006/main">
+  <p:cSld>
+    <p:spTree>
+      <p:nvGrpSpPr>
+        <p:cNvPr id="1" name=""/>
+        <p:cNvGrpSpPr/>
+        <p:nvPr/>
+      </p:nvGrpSpPr>
+      <p:grpSpPr>
+        <a:xfrm>
+          <a:off x="0" y="0"/>
+          <a:ext cx="0" cy="0"/>
+          <a:chOff x="0" y="0"/>
+          <a:chExt cx="0" cy="0"/>
+        </a:xfrm>
+      </p:grpSpPr>
+      <p:sp>
+        <p:nvSpPr>
+          <p:cNvPr id="2" name="標題 1"/>
+          <p:cNvSpPr>
+            <a:spLocks noGrp="1"/>
+          </p:cNvSpPr>
+          <p:nvPr>
+            <p:ph type="title"/>
+          </p:nvPr>
+        </p:nvSpPr>
+        <p:spPr/>
+        <p:txBody>
+          <a:bodyPr/>
+          <a:lstStyle/>
+          <a:p>
+            <a:r>
+              <a:rPr lang="zh-TW" altLang="en-US" dirty="0"/>
+              <a:t>比較</a:t>
+            </a:r>
+          </a:p>
+        </p:txBody>
+      </p:sp>
+      <p:pic>
+        <p:nvPicPr>
+          <p:cNvPr id="4" name="圖片 3"/>
+          <p:cNvPicPr>
+            <a:picLocks noChangeAspect="1"/>
+          </p:cNvPicPr>
+          <p:nvPr/>
+        </p:nvPicPr>
+        <p:blipFill>
+          <a:blip r:embed="rId2"/>
+          <a:stretch>
+            <a:fillRect/>
+          </a:stretch>
+        </p:blipFill>
+        <p:spPr>
+          <a:xfrm>
+            <a:off x="-97624" y="1443300"/>
+            <a:ext cx="6031635" cy="4930206"/>
+          </a:xfrm>
+          <a:prstGeom prst="rect">
+            <a:avLst/>
+          </a:prstGeom>
+        </p:spPr>
+      </p:pic>
+      <p:pic>
+        <p:nvPicPr>
+          <p:cNvPr id="7" name="圖片 6"/>
+          <p:cNvPicPr>
+            <a:picLocks noChangeAspect="1"/>
+          </p:cNvPicPr>
+          <p:nvPr/>
+        </p:nvPicPr>
+        <p:blipFill>
+          <a:blip r:embed="rId3"/>
+          <a:stretch>
+            <a:fillRect/>
+          </a:stretch>
+        </p:blipFill>
+        <p:spPr>
+          <a:xfrm>
+            <a:off x="5779063" y="1051560"/>
+            <a:ext cx="6422263" cy="5321945"/>
+          </a:xfrm>
+          <a:prstGeom prst="rect">
+            <a:avLst/>
+          </a:prstGeom>
+        </p:spPr>
+      </p:pic>
+      <p:sp>
+        <p:nvSpPr>
+          <p:cNvPr id="8" name="橢圓 7"/>
+          <p:cNvSpPr/>
+          <p:nvPr/>
+        </p:nvSpPr>
+        <p:spPr>
+          <a:xfrm>
+            <a:off x="9311640" y="4953000"/>
+            <a:ext cx="670560" cy="579120"/>
+          </a:xfrm>
+          <a:prstGeom prst="ellipse">
+            <a:avLst/>
+          </a:prstGeom>
+          <a:noFill/>
+          <a:ln>
+            <a:solidFill>
+              <a:srgbClr val="FF0000"/>
+            </a:solidFill>
+          </a:ln>
+        </p:spPr>
+        <p:style>
+          <a:lnRef idx="2">
+            <a:schemeClr val="accent1">
+              <a:shade val="50000"/>
+            </a:schemeClr>
+          </a:lnRef>
+          <a:fillRef idx="1">
+            <a:schemeClr val="accent1"/>
+          </a:fillRef>
+          <a:effectRef idx="0">
+            <a:schemeClr val="accent1"/>
+          </a:effectRef>
+          <a:fontRef idx="minor">
+            <a:schemeClr val="lt1"/>
+          </a:fontRef>
+        </p:style>
+        <p:txBody>
+          <a:bodyPr rtlCol="0" anchor="ctr"/>
+          <a:lstStyle/>
+          <a:p>
+            <a:pPr algn="ctr"/>
+            <a:endParaRPr lang="zh-TW" altLang="en-US"/>
+          </a:p>
+        </p:txBody>
+      </p:sp>
+      <p:sp>
+        <p:nvSpPr>
+          <p:cNvPr id="9" name="橢圓 8"/>
+          <p:cNvSpPr/>
+          <p:nvPr/>
+        </p:nvSpPr>
+        <p:spPr>
+          <a:xfrm>
+            <a:off x="8732388" y="4815840"/>
+            <a:ext cx="670560" cy="579120"/>
+          </a:xfrm>
+          <a:prstGeom prst="ellipse">
+            <a:avLst/>
+          </a:prstGeom>
+          <a:noFill/>
+          <a:ln>
+            <a:solidFill>
+              <a:srgbClr val="FF0000"/>
+            </a:solidFill>
+          </a:ln>
+        </p:spPr>
+        <p:style>
+          <a:lnRef idx="2">
+            <a:schemeClr val="accent1">
+              <a:shade val="50000"/>
+            </a:schemeClr>
+          </a:lnRef>
+          <a:fillRef idx="1">
+            <a:schemeClr val="accent1"/>
+          </a:fillRef>
+          <a:effectRef idx="0">
+            <a:schemeClr val="accent1"/>
+          </a:effectRef>
+          <a:fontRef idx="minor">
+            <a:schemeClr val="lt1"/>
+          </a:fontRef>
+        </p:style>
+        <p:txBody>
+          <a:bodyPr rtlCol="0" anchor="ctr"/>
+          <a:lstStyle/>
+          <a:p>
+            <a:pPr algn="ctr"/>
+            <a:endParaRPr lang="zh-TW" altLang="en-US"/>
+          </a:p>
+        </p:txBody>
+      </p:sp>
+    </p:spTree>
+    <p:extLst>
+      <p:ext uri="{BB962C8B-B14F-4D97-AF65-F5344CB8AC3E}">
+        <p14:creationId xmlns:p14="http://schemas.microsoft.com/office/powerpoint/2010/main" val="171501999"/>
+      </p:ext>
+    </p:extLst>
+  </p:cSld>
+  <p:clrMapOvr>
+    <a:masterClrMapping/>
+  </p:clrMapOvr>
+  <p:timing>
+    <p:tnLst>
+      <p:par>
+        <p:cTn id="1" dur="indefinite" restart="never" nodeType="tmRoot"/>
+      </p:par>
+    </p:tnLst>
+  </p:timing>
+</p:sld>
+</file>
+
+<file path=ppt/slides/slide43.xml><?xml version="1.0" encoding="utf-8"?>
+<p:sld xmlns:a="http://schemas.openxmlformats.org/drawingml/2006/main" xmlns:r="http://schemas.openxmlformats.org/officeDocument/2006/relationships" xmlns:p="http://schemas.openxmlformats.org/presentationml/2006/main">
+  <p:cSld>
+    <p:spTree>
+      <p:nvGrpSpPr>
+        <p:cNvPr id="1" name=""/>
+        <p:cNvGrpSpPr/>
+        <p:nvPr/>
+      </p:nvGrpSpPr>
+      <p:grpSpPr>
+        <a:xfrm>
+          <a:off x="0" y="0"/>
+          <a:ext cx="0" cy="0"/>
+          <a:chOff x="0" y="0"/>
+          <a:chExt cx="0" cy="0"/>
+        </a:xfrm>
+      </p:grpSpPr>
+      <p:sp>
+        <p:nvSpPr>
+          <p:cNvPr id="2" name="標題 1"/>
+          <p:cNvSpPr>
+            <a:spLocks noGrp="1"/>
+          </p:cNvSpPr>
+          <p:nvPr>
+            <p:ph type="title"/>
+          </p:nvPr>
+        </p:nvSpPr>
+        <p:spPr/>
+        <p:txBody>
+          <a:bodyPr/>
+          <a:lstStyle/>
+          <a:p>
+            <a:endParaRPr lang="zh-TW" altLang="en-US"/>
+          </a:p>
+        </p:txBody>
+      </p:sp>
+      <p:pic>
+        <p:nvPicPr>
+          <p:cNvPr id="4" name="圖片 3"/>
+          <p:cNvPicPr>
+            <a:picLocks noChangeAspect="1"/>
+          </p:cNvPicPr>
+          <p:nvPr/>
+        </p:nvPicPr>
+        <p:blipFill>
+          <a:blip r:embed="rId2"/>
+          <a:stretch>
+            <a:fillRect/>
+          </a:stretch>
+        </p:blipFill>
+        <p:spPr>
+          <a:xfrm>
+            <a:off x="-158400" y="201600"/>
+            <a:ext cx="6462713" cy="5192649"/>
+          </a:xfrm>
+          <a:prstGeom prst="rect">
+            <a:avLst/>
+          </a:prstGeom>
+        </p:spPr>
+      </p:pic>
+      <p:sp>
+        <p:nvSpPr>
+          <p:cNvPr id="7" name="文字方塊 6"/>
+          <p:cNvSpPr txBox="1"/>
+          <p:nvPr/>
+        </p:nvSpPr>
+        <p:spPr>
+          <a:xfrm>
+            <a:off x="688053" y="1039847"/>
+            <a:ext cx="2668038" cy="369332"/>
+          </a:xfrm>
+          <a:prstGeom prst="rect">
+            <a:avLst/>
+          </a:prstGeom>
+          <a:noFill/>
+        </p:spPr>
+        <p:txBody>
+          <a:bodyPr wrap="none" rtlCol="0">
+            <a:spAutoFit/>
+          </a:bodyPr>
+          <a:lstStyle/>
+          <a:p>
+            <a:r>
+              <a:rPr lang="en-US" altLang="zh-TW" b="1" dirty="0" smtClean="0">
+                <a:solidFill>
+                  <a:srgbClr val="FF0000"/>
+                </a:solidFill>
+              </a:rPr>
+              <a:t>Shape</a:t>
+            </a:r>
+            <a:r>
+              <a:rPr lang="zh-TW" altLang="en-US" b="1" dirty="0" smtClean="0">
+                <a:solidFill>
+                  <a:srgbClr val="FF0000"/>
+                </a:solidFill>
+              </a:rPr>
+              <a:t> </a:t>
+            </a:r>
+            <a:r>
+              <a:rPr lang="en-US" altLang="zh-TW" b="1" dirty="0" smtClean="0">
+                <a:solidFill>
+                  <a:srgbClr val="FF0000"/>
+                </a:solidFill>
+              </a:rPr>
+              <a:t>context</a:t>
+            </a:r>
+            <a:r>
+              <a:rPr lang="zh-TW" altLang="en-US" b="1" dirty="0" smtClean="0">
+                <a:solidFill>
+                  <a:srgbClr val="FF0000"/>
+                </a:solidFill>
+              </a:rPr>
+              <a:t>做完第一次</a:t>
+            </a:r>
+            <a:endParaRPr lang="zh-TW" altLang="en-US" b="1" dirty="0">
+              <a:solidFill>
+                <a:srgbClr val="FF0000"/>
+              </a:solidFill>
+            </a:endParaRPr>
+          </a:p>
+        </p:txBody>
+      </p:sp>
+      <p:pic>
+        <p:nvPicPr>
+          <p:cNvPr id="8" name="圖片 7"/>
+          <p:cNvPicPr>
+            <a:picLocks noChangeAspect="1"/>
+          </p:cNvPicPr>
+          <p:nvPr/>
+        </p:nvPicPr>
+        <p:blipFill>
+          <a:blip r:embed="rId3"/>
+          <a:stretch>
+            <a:fillRect/>
+          </a:stretch>
+        </p:blipFill>
+        <p:spPr>
+          <a:xfrm>
+            <a:off x="7297200" y="201600"/>
+            <a:ext cx="4877753" cy="3977640"/>
+          </a:xfrm>
+          <a:prstGeom prst="rect">
+            <a:avLst/>
+          </a:prstGeom>
+        </p:spPr>
+      </p:pic>
+      <p:pic>
+        <p:nvPicPr>
+          <p:cNvPr id="9" name="圖片 8"/>
+          <p:cNvPicPr>
+            <a:picLocks noChangeAspect="1"/>
+          </p:cNvPicPr>
+          <p:nvPr/>
+        </p:nvPicPr>
+        <p:blipFill>
+          <a:blip r:embed="rId4"/>
+          <a:stretch>
+            <a:fillRect/>
+          </a:stretch>
+        </p:blipFill>
+        <p:spPr>
+          <a:xfrm>
+            <a:off x="5695200" y="3427200"/>
+            <a:ext cx="4320540" cy="3550920"/>
+          </a:xfrm>
+          <a:prstGeom prst="rect">
+            <a:avLst/>
+          </a:prstGeom>
+        </p:spPr>
+      </p:pic>
+    </p:spTree>
+    <p:extLst>
+      <p:ext uri="{BB962C8B-B14F-4D97-AF65-F5344CB8AC3E}">
+        <p14:creationId xmlns:p14="http://schemas.microsoft.com/office/powerpoint/2010/main" val="1082767324"/>
+      </p:ext>
+    </p:extLst>
+  </p:cSld>
+  <p:clrMapOvr>
+    <a:masterClrMapping/>
+  </p:clrMapOvr>
+  <p:timing>
+    <p:tnLst>
+      <p:par>
+        <p:cTn id="1" dur="indefinite" restart="never" nodeType="tmRoot"/>
+      </p:par>
+    </p:tnLst>
+  </p:timing>
+</p:sld>
+</file>
+
+<file path=ppt/slides/slide44.xml><?xml version="1.0" encoding="utf-8"?>
+<p:sld xmlns:a="http://schemas.openxmlformats.org/drawingml/2006/main" xmlns:r="http://schemas.openxmlformats.org/officeDocument/2006/relationships" xmlns:p="http://schemas.openxmlformats.org/presentationml/2006/main">
+  <p:cSld>
+    <p:spTree>
+      <p:nvGrpSpPr>
+        <p:cNvPr id="1" name=""/>
+        <p:cNvGrpSpPr/>
+        <p:nvPr/>
+      </p:nvGrpSpPr>
+      <p:grpSpPr>
+        <a:xfrm>
+          <a:off x="0" y="0"/>
+          <a:ext cx="0" cy="0"/>
+          <a:chOff x="0" y="0"/>
+          <a:chExt cx="0" cy="0"/>
+        </a:xfrm>
+      </p:grpSpPr>
+      <p:sp>
+        <p:nvSpPr>
+          <p:cNvPr id="2" name="標題 1"/>
+          <p:cNvSpPr>
+            <a:spLocks noGrp="1"/>
+          </p:cNvSpPr>
+          <p:nvPr>
+            <p:ph type="title"/>
+          </p:nvPr>
+        </p:nvSpPr>
+        <p:spPr/>
+        <p:txBody>
+          <a:bodyPr/>
+          <a:lstStyle/>
+          <a:p>
+            <a:r>
+              <a:rPr lang="zh-TW" altLang="en-US" dirty="0"/>
+              <a:t>比較</a:t>
+            </a:r>
+          </a:p>
+        </p:txBody>
+      </p:sp>
+      <p:pic>
+        <p:nvPicPr>
+          <p:cNvPr id="5" name="圖片 4"/>
+          <p:cNvPicPr>
+            <a:picLocks noChangeAspect="1"/>
+          </p:cNvPicPr>
+          <p:nvPr/>
+        </p:nvPicPr>
+        <p:blipFill>
+          <a:blip r:embed="rId2"/>
+          <a:stretch>
+            <a:fillRect/>
+          </a:stretch>
+        </p:blipFill>
+        <p:spPr>
+          <a:xfrm>
+            <a:off x="-97200" y="1443600"/>
+            <a:ext cx="6024563" cy="4840605"/>
+          </a:xfrm>
+          <a:prstGeom prst="rect">
+            <a:avLst/>
+          </a:prstGeom>
+        </p:spPr>
+      </p:pic>
+      <p:sp>
+        <p:nvSpPr>
+          <p:cNvPr id="7" name="文字方塊 6"/>
+          <p:cNvSpPr txBox="1"/>
+          <p:nvPr/>
+        </p:nvSpPr>
+        <p:spPr>
+          <a:xfrm>
+            <a:off x="500926" y="2060927"/>
+            <a:ext cx="2668038" cy="369332"/>
+          </a:xfrm>
+          <a:prstGeom prst="rect">
+            <a:avLst/>
+          </a:prstGeom>
+          <a:noFill/>
+        </p:spPr>
+        <p:txBody>
+          <a:bodyPr wrap="none" rtlCol="0">
+            <a:spAutoFit/>
+          </a:bodyPr>
+          <a:lstStyle/>
+          <a:p>
+            <a:r>
+              <a:rPr lang="en-US" altLang="zh-TW" b="1" dirty="0" smtClean="0">
+                <a:solidFill>
+                  <a:srgbClr val="FF0000"/>
+                </a:solidFill>
+              </a:rPr>
+              <a:t>Shape</a:t>
+            </a:r>
+            <a:r>
+              <a:rPr lang="zh-TW" altLang="en-US" b="1" dirty="0" smtClean="0">
+                <a:solidFill>
+                  <a:srgbClr val="FF0000"/>
+                </a:solidFill>
+              </a:rPr>
+              <a:t> </a:t>
+            </a:r>
+            <a:r>
+              <a:rPr lang="en-US" altLang="zh-TW" b="1" dirty="0" smtClean="0">
+                <a:solidFill>
+                  <a:srgbClr val="FF0000"/>
+                </a:solidFill>
+              </a:rPr>
+              <a:t>context</a:t>
+            </a:r>
+            <a:r>
+              <a:rPr lang="zh-TW" altLang="en-US" b="1" dirty="0" smtClean="0">
+                <a:solidFill>
+                  <a:srgbClr val="FF0000"/>
+                </a:solidFill>
+              </a:rPr>
+              <a:t>做完第一次</a:t>
+            </a:r>
+            <a:endParaRPr lang="zh-TW" altLang="en-US" b="1" dirty="0">
+              <a:solidFill>
+                <a:srgbClr val="FF0000"/>
+              </a:solidFill>
+            </a:endParaRPr>
+          </a:p>
+        </p:txBody>
+      </p:sp>
+      <p:pic>
+        <p:nvPicPr>
+          <p:cNvPr id="8" name="圖片 7"/>
+          <p:cNvPicPr>
+            <a:picLocks noChangeAspect="1"/>
+          </p:cNvPicPr>
+          <p:nvPr/>
+        </p:nvPicPr>
+        <p:blipFill>
+          <a:blip r:embed="rId3"/>
+          <a:stretch>
+            <a:fillRect/>
+          </a:stretch>
+        </p:blipFill>
+        <p:spPr>
+          <a:xfrm>
+            <a:off x="5852161" y="982402"/>
+            <a:ext cx="6339840" cy="5301803"/>
+          </a:xfrm>
+          <a:prstGeom prst="rect">
+            <a:avLst/>
+          </a:prstGeom>
+        </p:spPr>
+      </p:pic>
+      <p:sp>
+        <p:nvSpPr>
+          <p:cNvPr id="9" name="橢圓 8"/>
+          <p:cNvSpPr/>
+          <p:nvPr/>
+        </p:nvSpPr>
+        <p:spPr>
+          <a:xfrm>
+            <a:off x="9692640" y="4251960"/>
+            <a:ext cx="670560" cy="579120"/>
+          </a:xfrm>
+          <a:prstGeom prst="ellipse">
+            <a:avLst/>
+          </a:prstGeom>
+          <a:noFill/>
+          <a:ln>
+            <a:solidFill>
+              <a:srgbClr val="FF0000"/>
+            </a:solidFill>
+          </a:ln>
+        </p:spPr>
+        <p:style>
+          <a:lnRef idx="2">
+            <a:schemeClr val="accent1">
+              <a:shade val="50000"/>
+            </a:schemeClr>
+          </a:lnRef>
+          <a:fillRef idx="1">
+            <a:schemeClr val="accent1"/>
+          </a:fillRef>
+          <a:effectRef idx="0">
+            <a:schemeClr val="accent1"/>
+          </a:effectRef>
+          <a:fontRef idx="minor">
+            <a:schemeClr val="lt1"/>
+          </a:fontRef>
+        </p:style>
+        <p:txBody>
+          <a:bodyPr rtlCol="0" anchor="ctr"/>
+          <a:lstStyle/>
+          <a:p>
+            <a:pPr algn="ctr"/>
+            <a:endParaRPr lang="zh-TW" altLang="en-US"/>
+          </a:p>
+        </p:txBody>
+      </p:sp>
+    </p:spTree>
+    <p:extLst>
+      <p:ext uri="{BB962C8B-B14F-4D97-AF65-F5344CB8AC3E}">
+        <p14:creationId xmlns:p14="http://schemas.microsoft.com/office/powerpoint/2010/main" val="739329793"/>
+      </p:ext>
+    </p:extLst>
+  </p:cSld>
+  <p:clrMapOvr>
+    <a:masterClrMapping/>
+  </p:clrMapOvr>
+  <p:timing>
+    <p:tnLst>
+      <p:par>
+        <p:cTn id="1" dur="indefinite" restart="never" nodeType="tmRoot"/>
+      </p:par>
+    </p:tnLst>
+  </p:timing>
+</p:sld>
+</file>
+
+<file path=ppt/slides/slide45.xml><?xml version="1.0" encoding="utf-8"?>
+<p:sld xmlns:a="http://schemas.openxmlformats.org/drawingml/2006/main" xmlns:r="http://schemas.openxmlformats.org/officeDocument/2006/relationships" xmlns:p="http://schemas.openxmlformats.org/presentationml/2006/main">
+  <p:cSld>
+    <p:spTree>
+      <p:nvGrpSpPr>
+        <p:cNvPr id="1" name=""/>
+        <p:cNvGrpSpPr/>
+        <p:nvPr/>
+      </p:nvGrpSpPr>
+      <p:grpSpPr>
+        <a:xfrm>
+          <a:off x="0" y="0"/>
+          <a:ext cx="0" cy="0"/>
+          <a:chOff x="0" y="0"/>
+          <a:chExt cx="0" cy="0"/>
+        </a:xfrm>
+      </p:grpSpPr>
+      <p:sp>
+        <p:nvSpPr>
+          <p:cNvPr id="2" name="標題 1"/>
+          <p:cNvSpPr>
+            <a:spLocks noGrp="1"/>
+          </p:cNvSpPr>
+          <p:nvPr>
+            <p:ph type="title"/>
+          </p:nvPr>
+        </p:nvSpPr>
+        <p:spPr/>
+        <p:txBody>
+          <a:bodyPr/>
+          <a:lstStyle/>
+          <a:p>
+            <a:endParaRPr lang="zh-TW" altLang="en-US"/>
+          </a:p>
+        </p:txBody>
+      </p:sp>
+      <p:pic>
+        <p:nvPicPr>
+          <p:cNvPr id="4" name="內容版面配置區 3"/>
+          <p:cNvPicPr>
+            <a:picLocks noGrp="1" noChangeAspect="1"/>
+          </p:cNvPicPr>
+          <p:nvPr>
+            <p:ph idx="1"/>
+          </p:nvPr>
+        </p:nvPicPr>
+        <p:blipFill rotWithShape="1">
+          <a:blip r:embed="rId2" cstate="print">
+            <a:extLst>
+              <a:ext uri="{28A0092B-C50C-407E-A947-70E740481C1C}">
+                <a14:useLocalDpi xmlns:a14="http://schemas.microsoft.com/office/drawing/2010/main" val="0"/>
+              </a:ext>
+            </a:extLst>
+          </a:blip>
+          <a:srcRect l="33845" r="18085"/>
+          <a:stretch/>
+        </p:blipFill>
+        <p:spPr>
+          <a:xfrm>
+            <a:off x="307025" y="2470151"/>
+            <a:ext cx="3718560" cy="4351338"/>
+          </a:xfrm>
+        </p:spPr>
+      </p:pic>
+      <p:pic>
+        <p:nvPicPr>
+          <p:cNvPr id="5" name="圖片 4"/>
+          <p:cNvPicPr>
+            <a:picLocks noChangeAspect="1"/>
+          </p:cNvPicPr>
+          <p:nvPr/>
+        </p:nvPicPr>
+        <p:blipFill rotWithShape="1">
+          <a:blip r:embed="rId3" cstate="print">
+            <a:extLst>
+              <a:ext uri="{28A0092B-C50C-407E-A947-70E740481C1C}">
+                <a14:useLocalDpi xmlns:a14="http://schemas.microsoft.com/office/drawing/2010/main" val="0"/>
+              </a:ext>
+            </a:extLst>
+          </a:blip>
+          <a:srcRect l="34893" r="21915"/>
+          <a:stretch/>
+        </p:blipFill>
+        <p:spPr>
+          <a:xfrm>
+            <a:off x="8422038" y="2467771"/>
+            <a:ext cx="3319920" cy="4323664"/>
+          </a:xfrm>
+          <a:prstGeom prst="rect">
+            <a:avLst/>
+          </a:prstGeom>
+        </p:spPr>
+      </p:pic>
+      <p:pic>
+        <p:nvPicPr>
+          <p:cNvPr id="6" name="圖片 5"/>
+          <p:cNvPicPr>
+            <a:picLocks noChangeAspect="1"/>
+          </p:cNvPicPr>
+          <p:nvPr/>
+        </p:nvPicPr>
+        <p:blipFill rotWithShape="1">
+          <a:blip r:embed="rId4" cstate="print">
+            <a:extLst>
+              <a:ext uri="{28A0092B-C50C-407E-A947-70E740481C1C}">
+                <a14:useLocalDpi xmlns:a14="http://schemas.microsoft.com/office/drawing/2010/main" val="0"/>
+              </a:ext>
+            </a:extLst>
+          </a:blip>
+          <a:srcRect l="39945" r="9788"/>
+          <a:stretch/>
+        </p:blipFill>
+        <p:spPr>
+          <a:xfrm>
+            <a:off x="4291911" y="2470151"/>
+            <a:ext cx="3863801" cy="4323664"/>
+          </a:xfrm>
+          <a:prstGeom prst="rect">
+            <a:avLst/>
+          </a:prstGeom>
+        </p:spPr>
+      </p:pic>
+      <p:pic>
+        <p:nvPicPr>
+          <p:cNvPr id="7" name="圖片 6"/>
+          <p:cNvPicPr>
+            <a:picLocks noChangeAspect="1"/>
+          </p:cNvPicPr>
+          <p:nvPr/>
+        </p:nvPicPr>
+        <p:blipFill rotWithShape="1">
+          <a:blip r:embed="rId5" cstate="print">
+            <a:extLst>
+              <a:ext uri="{28A0092B-C50C-407E-A947-70E740481C1C}">
+                <a14:useLocalDpi xmlns:a14="http://schemas.microsoft.com/office/drawing/2010/main" val="0"/>
+              </a:ext>
+            </a:extLst>
+          </a:blip>
+          <a:srcRect t="23636" b="19199"/>
+          <a:stretch/>
+        </p:blipFill>
+        <p:spPr>
+          <a:xfrm>
+            <a:off x="35397" y="-109889"/>
+            <a:ext cx="2372524" cy="2411129"/>
+          </a:xfrm>
+          <a:prstGeom prst="rect">
+            <a:avLst/>
+          </a:prstGeom>
+        </p:spPr>
+      </p:pic>
+    </p:spTree>
+    <p:extLst>
+      <p:ext uri="{BB962C8B-B14F-4D97-AF65-F5344CB8AC3E}">
+        <p14:creationId xmlns:p14="http://schemas.microsoft.com/office/powerpoint/2010/main" val="2961429747"/>
+      </p:ext>
+    </p:extLst>
+  </p:cSld>
+  <p:clrMapOvr>
+    <a:masterClrMapping/>
+  </p:clrMapOvr>
+  <p:timing>
+    <p:tnLst>
+      <p:par>
+        <p:cTn id="1" dur="indefinite" restart="never" nodeType="tmRoot"/>
+      </p:par>
+    </p:tnLst>
+  </p:timing>
+</p:sld>
+</file>
+
+<file path=ppt/slides/slide46.xml><?xml version="1.0" encoding="utf-8"?>
+<p:sld xmlns:a="http://schemas.openxmlformats.org/drawingml/2006/main" xmlns:r="http://schemas.openxmlformats.org/officeDocument/2006/relationships" xmlns:p="http://schemas.openxmlformats.org/presentationml/2006/main">
+  <p:cSld>
+    <p:spTree>
+      <p:nvGrpSpPr>
+        <p:cNvPr id="1" name=""/>
+        <p:cNvGrpSpPr/>
+        <p:nvPr/>
+      </p:nvGrpSpPr>
+      <p:grpSpPr>
+        <a:xfrm>
+          <a:off x="0" y="0"/>
+          <a:ext cx="0" cy="0"/>
+          <a:chOff x="0" y="0"/>
+          <a:chExt cx="0" cy="0"/>
+        </a:xfrm>
+      </p:grpSpPr>
+      <p:sp>
+        <p:nvSpPr>
+          <p:cNvPr id="2" name="標題 1"/>
+          <p:cNvSpPr>
+            <a:spLocks noGrp="1"/>
+          </p:cNvSpPr>
+          <p:nvPr>
+            <p:ph type="title"/>
+          </p:nvPr>
+        </p:nvSpPr>
+        <p:spPr/>
+        <p:txBody>
+          <a:bodyPr/>
+          <a:lstStyle/>
+          <a:p>
+            <a:endParaRPr lang="zh-TW" altLang="en-US"/>
+          </a:p>
+        </p:txBody>
+      </p:sp>
+      <p:sp>
+        <p:nvSpPr>
+          <p:cNvPr id="7" name="文字方塊 6"/>
+          <p:cNvSpPr txBox="1"/>
+          <p:nvPr/>
+        </p:nvSpPr>
+        <p:spPr>
+          <a:xfrm>
+            <a:off x="150326" y="122831"/>
+            <a:ext cx="2668038" cy="369332"/>
+          </a:xfrm>
+          <a:prstGeom prst="rect">
+            <a:avLst/>
+          </a:prstGeom>
+          <a:noFill/>
+        </p:spPr>
+        <p:txBody>
+          <a:bodyPr wrap="none" rtlCol="0">
+            <a:spAutoFit/>
+          </a:bodyPr>
+          <a:lstStyle/>
+          <a:p>
+            <a:r>
+              <a:rPr lang="en-US" altLang="zh-TW" b="1" dirty="0" smtClean="0">
+                <a:solidFill>
+                  <a:srgbClr val="FF0000"/>
+                </a:solidFill>
+              </a:rPr>
+              <a:t>Shape</a:t>
+            </a:r>
+            <a:r>
+              <a:rPr lang="zh-TW" altLang="en-US" b="1" dirty="0" smtClean="0">
+                <a:solidFill>
+                  <a:srgbClr val="FF0000"/>
+                </a:solidFill>
+              </a:rPr>
+              <a:t> </a:t>
+            </a:r>
+            <a:r>
+              <a:rPr lang="en-US" altLang="zh-TW" b="1" dirty="0" smtClean="0">
+                <a:solidFill>
+                  <a:srgbClr val="FF0000"/>
+                </a:solidFill>
+              </a:rPr>
+              <a:t>context</a:t>
+            </a:r>
+            <a:r>
+              <a:rPr lang="zh-TW" altLang="en-US" b="1" dirty="0" smtClean="0">
+                <a:solidFill>
+                  <a:srgbClr val="FF0000"/>
+                </a:solidFill>
+              </a:rPr>
+              <a:t>做完第一次</a:t>
+            </a:r>
+            <a:endParaRPr lang="zh-TW" altLang="en-US" b="1" dirty="0">
+              <a:solidFill>
+                <a:srgbClr val="FF0000"/>
+              </a:solidFill>
+            </a:endParaRPr>
+          </a:p>
+        </p:txBody>
+      </p:sp>
+      <p:pic>
+        <p:nvPicPr>
+          <p:cNvPr id="8" name="圖片 7"/>
+          <p:cNvPicPr>
+            <a:picLocks noChangeAspect="1"/>
+          </p:cNvPicPr>
+          <p:nvPr/>
+        </p:nvPicPr>
+        <p:blipFill>
+          <a:blip r:embed="rId2"/>
+          <a:stretch>
+            <a:fillRect/>
+          </a:stretch>
+        </p:blipFill>
+        <p:spPr>
+          <a:xfrm>
+            <a:off x="7192802" y="3"/>
+            <a:ext cx="5065014" cy="4074795"/>
+          </a:xfrm>
+          <a:prstGeom prst="rect">
+            <a:avLst/>
+          </a:prstGeom>
+        </p:spPr>
+      </p:pic>
+      <p:pic>
+        <p:nvPicPr>
+          <p:cNvPr id="9" name="圖片 8"/>
+          <p:cNvPicPr>
+            <a:picLocks noChangeAspect="1"/>
+          </p:cNvPicPr>
+          <p:nvPr/>
+        </p:nvPicPr>
+        <p:blipFill>
+          <a:blip r:embed="rId3"/>
+          <a:stretch>
+            <a:fillRect/>
+          </a:stretch>
+        </p:blipFill>
+        <p:spPr>
+          <a:xfrm>
+            <a:off x="0" y="619200"/>
+            <a:ext cx="6888480" cy="5681472"/>
+          </a:xfrm>
+          <a:prstGeom prst="rect">
+            <a:avLst/>
+          </a:prstGeom>
+        </p:spPr>
+      </p:pic>
+      <p:pic>
+        <p:nvPicPr>
+          <p:cNvPr id="10" name="圖片 9"/>
+          <p:cNvPicPr>
+            <a:picLocks noChangeAspect="1"/>
+          </p:cNvPicPr>
+          <p:nvPr/>
+        </p:nvPicPr>
+        <p:blipFill>
+          <a:blip r:embed="rId4"/>
+          <a:stretch>
+            <a:fillRect/>
+          </a:stretch>
+        </p:blipFill>
+        <p:spPr>
+          <a:xfrm>
+            <a:off x="5241600" y="3009600"/>
+            <a:ext cx="6015895" cy="4852892"/>
+          </a:xfrm>
+          <a:prstGeom prst="rect">
+            <a:avLst/>
+          </a:prstGeom>
+        </p:spPr>
+      </p:pic>
+    </p:spTree>
+    <p:extLst>
+      <p:ext uri="{BB962C8B-B14F-4D97-AF65-F5344CB8AC3E}">
+        <p14:creationId xmlns:p14="http://schemas.microsoft.com/office/powerpoint/2010/main" val="2168795263"/>
+      </p:ext>
+    </p:extLst>
+  </p:cSld>
+  <p:clrMapOvr>
+    <a:masterClrMapping/>
+  </p:clrMapOvr>
+  <p:timing>
+    <p:tnLst>
+      <p:par>
+        <p:cTn id="1" dur="indefinite" restart="never" nodeType="tmRoot"/>
+      </p:par>
+    </p:tnLst>
+  </p:timing>
+</p:sld>
+</file>
+
+<file path=ppt/slides/slide47.xml><?xml version="1.0" encoding="utf-8"?>
+<p:sld xmlns:a="http://schemas.openxmlformats.org/drawingml/2006/main" xmlns:r="http://schemas.openxmlformats.org/officeDocument/2006/relationships" xmlns:p="http://schemas.openxmlformats.org/presentationml/2006/main">
+  <p:cSld>
+    <p:spTree>
+      <p:nvGrpSpPr>
+        <p:cNvPr id="1" name=""/>
+        <p:cNvGrpSpPr/>
+        <p:nvPr/>
+      </p:nvGrpSpPr>
+      <p:grpSpPr>
+        <a:xfrm>
+          <a:off x="0" y="0"/>
+          <a:ext cx="0" cy="0"/>
+          <a:chOff x="0" y="0"/>
+          <a:chExt cx="0" cy="0"/>
+        </a:xfrm>
+      </p:grpSpPr>
+      <p:sp>
+        <p:nvSpPr>
+          <p:cNvPr id="7" name="文字方塊 6"/>
+          <p:cNvSpPr txBox="1"/>
+          <p:nvPr/>
+        </p:nvSpPr>
+        <p:spPr>
+          <a:xfrm>
+            <a:off x="121920" y="239869"/>
+            <a:ext cx="2668038" cy="369332"/>
+          </a:xfrm>
+          <a:prstGeom prst="rect">
+            <a:avLst/>
+          </a:prstGeom>
+          <a:noFill/>
+        </p:spPr>
+        <p:txBody>
+          <a:bodyPr wrap="none" rtlCol="0">
+            <a:spAutoFit/>
+          </a:bodyPr>
+          <a:lstStyle/>
+          <a:p>
+            <a:r>
+              <a:rPr lang="en-US" altLang="zh-TW" b="1" dirty="0" smtClean="0">
+                <a:solidFill>
+                  <a:srgbClr val="FF0000"/>
+                </a:solidFill>
+              </a:rPr>
+              <a:t>Shape</a:t>
+            </a:r>
+            <a:r>
+              <a:rPr lang="zh-TW" altLang="en-US" b="1" dirty="0" smtClean="0">
+                <a:solidFill>
+                  <a:srgbClr val="FF0000"/>
+                </a:solidFill>
+              </a:rPr>
+              <a:t> </a:t>
+            </a:r>
+            <a:r>
+              <a:rPr lang="en-US" altLang="zh-TW" b="1" dirty="0" smtClean="0">
+                <a:solidFill>
+                  <a:srgbClr val="FF0000"/>
+                </a:solidFill>
+              </a:rPr>
+              <a:t>context</a:t>
+            </a:r>
+            <a:r>
+              <a:rPr lang="zh-TW" altLang="en-US" b="1" dirty="0" smtClean="0">
+                <a:solidFill>
+                  <a:srgbClr val="FF0000"/>
+                </a:solidFill>
+              </a:rPr>
+              <a:t>做完第一次</a:t>
+            </a:r>
+            <a:endParaRPr lang="zh-TW" altLang="en-US" b="1" dirty="0">
+              <a:solidFill>
+                <a:srgbClr val="FF0000"/>
+              </a:solidFill>
+            </a:endParaRPr>
+          </a:p>
+        </p:txBody>
+      </p:sp>
+      <p:pic>
+        <p:nvPicPr>
+          <p:cNvPr id="9" name="圖片 8"/>
+          <p:cNvPicPr>
+            <a:picLocks noChangeAspect="1"/>
+          </p:cNvPicPr>
+          <p:nvPr/>
+        </p:nvPicPr>
+        <p:blipFill>
+          <a:blip r:embed="rId2"/>
+          <a:stretch>
+            <a:fillRect/>
+          </a:stretch>
+        </p:blipFill>
+        <p:spPr>
+          <a:xfrm>
+            <a:off x="122400" y="608400"/>
+            <a:ext cx="7319010" cy="6036564"/>
+          </a:xfrm>
+          <a:prstGeom prst="rect">
+            <a:avLst/>
+          </a:prstGeom>
+        </p:spPr>
+      </p:pic>
+      <p:pic>
+        <p:nvPicPr>
+          <p:cNvPr id="8" name="圖片 7"/>
+          <p:cNvPicPr>
+            <a:picLocks noChangeAspect="1"/>
+          </p:cNvPicPr>
+          <p:nvPr/>
+        </p:nvPicPr>
+        <p:blipFill>
+          <a:blip r:embed="rId3"/>
+          <a:stretch>
+            <a:fillRect/>
+          </a:stretch>
+        </p:blipFill>
+        <p:spPr>
+          <a:xfrm>
+            <a:off x="5519742" y="121920"/>
+            <a:ext cx="7699107" cy="6523044"/>
+          </a:xfrm>
+          <a:prstGeom prst="rect">
+            <a:avLst/>
+          </a:prstGeom>
+        </p:spPr>
+      </p:pic>
+    </p:spTree>
+    <p:extLst>
+      <p:ext uri="{BB962C8B-B14F-4D97-AF65-F5344CB8AC3E}">
+        <p14:creationId xmlns:p14="http://schemas.microsoft.com/office/powerpoint/2010/main" val="1885850737"/>
+      </p:ext>
+    </p:extLst>
+  </p:cSld>
+  <p:clrMapOvr>
+    <a:masterClrMapping/>
+  </p:clrMapOvr>
+  <p:timing>
+    <p:tnLst>
+      <p:par>
+        <p:cTn id="1" dur="indefinite" restart="never" nodeType="tmRoot"/>
+      </p:par>
+    </p:tnLst>
+  </p:timing>
+</p:sld>
+</file>
+
+<file path=ppt/slides/slide48.xml><?xml version="1.0" encoding="utf-8"?>
+<p:sld xmlns:a="http://schemas.openxmlformats.org/drawingml/2006/main" xmlns:r="http://schemas.openxmlformats.org/officeDocument/2006/relationships" xmlns:p="http://schemas.openxmlformats.org/presentationml/2006/main">
+  <p:cSld>
+    <p:spTree>
+      <p:nvGrpSpPr>
+        <p:cNvPr id="1" name=""/>
+        <p:cNvGrpSpPr/>
+        <p:nvPr/>
+      </p:nvGrpSpPr>
+      <p:grpSpPr>
+        <a:xfrm>
+          <a:off x="0" y="0"/>
+          <a:ext cx="0" cy="0"/>
+          <a:chOff x="0" y="0"/>
+          <a:chExt cx="0" cy="0"/>
+        </a:xfrm>
+      </p:grpSpPr>
+      <p:sp>
+        <p:nvSpPr>
+          <p:cNvPr id="2" name="標題 1"/>
+          <p:cNvSpPr>
+            <a:spLocks noGrp="1"/>
+          </p:cNvSpPr>
+          <p:nvPr>
+            <p:ph type="title"/>
+          </p:nvPr>
+        </p:nvSpPr>
+        <p:spPr/>
+        <p:txBody>
+          <a:bodyPr/>
+          <a:lstStyle/>
+          <a:p>
+            <a:endParaRPr lang="zh-TW" altLang="en-US"/>
+          </a:p>
+        </p:txBody>
+      </p:sp>
+      <p:sp>
+        <p:nvSpPr>
+          <p:cNvPr id="3" name="內容版面配置區 2"/>
+          <p:cNvSpPr>
+            <a:spLocks noGrp="1"/>
+          </p:cNvSpPr>
+          <p:nvPr>
+            <p:ph idx="1"/>
+          </p:nvPr>
+        </p:nvSpPr>
+        <p:spPr/>
+        <p:txBody>
+          <a:bodyPr/>
+          <a:lstStyle/>
+          <a:p>
+            <a:endParaRPr lang="zh-TW" altLang="en-US"/>
+          </a:p>
+        </p:txBody>
+      </p:sp>
+      <p:sp>
+        <p:nvSpPr>
+          <p:cNvPr id="7" name="文字方塊 6"/>
+          <p:cNvSpPr txBox="1"/>
+          <p:nvPr/>
+        </p:nvSpPr>
+        <p:spPr>
+          <a:xfrm>
+            <a:off x="0" y="27651"/>
+            <a:ext cx="2668038" cy="369332"/>
+          </a:xfrm>
+          <a:prstGeom prst="rect">
+            <a:avLst/>
+          </a:prstGeom>
+          <a:noFill/>
+        </p:spPr>
+        <p:txBody>
+          <a:bodyPr wrap="none" rtlCol="0">
+            <a:spAutoFit/>
+          </a:bodyPr>
+          <a:lstStyle/>
+          <a:p>
+            <a:r>
+              <a:rPr lang="en-US" altLang="zh-TW" b="1" dirty="0" smtClean="0">
+                <a:solidFill>
+                  <a:srgbClr val="FF0000"/>
+                </a:solidFill>
+              </a:rPr>
+              <a:t>Shape</a:t>
+            </a:r>
+            <a:r>
+              <a:rPr lang="zh-TW" altLang="en-US" b="1" dirty="0" smtClean="0">
+                <a:solidFill>
+                  <a:srgbClr val="FF0000"/>
+                </a:solidFill>
+              </a:rPr>
+              <a:t> </a:t>
+            </a:r>
+            <a:r>
+              <a:rPr lang="en-US" altLang="zh-TW" b="1" dirty="0" smtClean="0">
+                <a:solidFill>
+                  <a:srgbClr val="FF0000"/>
+                </a:solidFill>
+              </a:rPr>
+              <a:t>context</a:t>
+            </a:r>
+            <a:r>
+              <a:rPr lang="zh-TW" altLang="en-US" b="1" dirty="0" smtClean="0">
+                <a:solidFill>
+                  <a:srgbClr val="FF0000"/>
+                </a:solidFill>
+              </a:rPr>
+              <a:t>做完第一次</a:t>
+            </a:r>
+            <a:endParaRPr lang="zh-TW" altLang="en-US" b="1" dirty="0">
+              <a:solidFill>
+                <a:srgbClr val="FF0000"/>
+              </a:solidFill>
+            </a:endParaRPr>
+          </a:p>
+        </p:txBody>
+      </p:sp>
+      <p:pic>
+        <p:nvPicPr>
+          <p:cNvPr id="8" name="圖片 7"/>
+          <p:cNvPicPr>
+            <a:picLocks noChangeAspect="1"/>
+          </p:cNvPicPr>
+          <p:nvPr/>
+        </p:nvPicPr>
+        <p:blipFill>
+          <a:blip r:embed="rId2"/>
+          <a:stretch>
+            <a:fillRect/>
+          </a:stretch>
+        </p:blipFill>
+        <p:spPr>
+          <a:xfrm>
+            <a:off x="0" y="619200"/>
+            <a:ext cx="6949440" cy="5669280"/>
+          </a:xfrm>
+          <a:prstGeom prst="rect">
+            <a:avLst/>
+          </a:prstGeom>
+        </p:spPr>
+      </p:pic>
+      <p:pic>
+        <p:nvPicPr>
+          <p:cNvPr id="9" name="圖片 8"/>
+          <p:cNvPicPr>
+            <a:picLocks noChangeAspect="1"/>
+          </p:cNvPicPr>
+          <p:nvPr/>
+        </p:nvPicPr>
+        <p:blipFill>
+          <a:blip r:embed="rId3"/>
+          <a:stretch>
+            <a:fillRect/>
+          </a:stretch>
+        </p:blipFill>
+        <p:spPr>
+          <a:xfrm>
+            <a:off x="7192803" y="1"/>
+            <a:ext cx="5056251" cy="4092321"/>
+          </a:xfrm>
+          <a:prstGeom prst="rect">
+            <a:avLst/>
+          </a:prstGeom>
+        </p:spPr>
+      </p:pic>
+      <p:pic>
+        <p:nvPicPr>
+          <p:cNvPr id="10" name="圖片 9"/>
+          <p:cNvPicPr>
+            <a:picLocks noChangeAspect="1"/>
+          </p:cNvPicPr>
+          <p:nvPr/>
+        </p:nvPicPr>
+        <p:blipFill>
+          <a:blip r:embed="rId4"/>
+          <a:stretch>
+            <a:fillRect/>
+          </a:stretch>
+        </p:blipFill>
+        <p:spPr>
+          <a:xfrm>
+            <a:off x="5241603" y="3009605"/>
+            <a:ext cx="4975289" cy="4056507"/>
+          </a:xfrm>
+          <a:prstGeom prst="rect">
+            <a:avLst/>
+          </a:prstGeom>
+        </p:spPr>
+      </p:pic>
+    </p:spTree>
+    <p:extLst>
+      <p:ext uri="{BB962C8B-B14F-4D97-AF65-F5344CB8AC3E}">
+        <p14:creationId xmlns:p14="http://schemas.microsoft.com/office/powerpoint/2010/main" val="3269784205"/>
+      </p:ext>
+    </p:extLst>
+  </p:cSld>
+  <p:clrMapOvr>
+    <a:masterClrMapping/>
+  </p:clrMapOvr>
+  <p:timing>
+    <p:tnLst>
+      <p:par>
+        <p:cTn id="1" dur="indefinite" restart="never" nodeType="tmRoot"/>
+      </p:par>
+    </p:tnLst>
+  </p:timing>
+</p:sld>
+</file>
+
+<file path=ppt/slides/slide49.xml><?xml version="1.0" encoding="utf-8"?>
+<p:sld xmlns:a="http://schemas.openxmlformats.org/drawingml/2006/main" xmlns:r="http://schemas.openxmlformats.org/officeDocument/2006/relationships" xmlns:p="http://schemas.openxmlformats.org/presentationml/2006/main">
+  <p:cSld>
+    <p:spTree>
+      <p:nvGrpSpPr>
+        <p:cNvPr id="1" name=""/>
+        <p:cNvGrpSpPr/>
+        <p:nvPr/>
+      </p:nvGrpSpPr>
+      <p:grpSpPr>
+        <a:xfrm>
+          <a:off x="0" y="0"/>
+          <a:ext cx="0" cy="0"/>
+          <a:chOff x="0" y="0"/>
+          <a:chExt cx="0" cy="0"/>
+        </a:xfrm>
+      </p:grpSpPr>
+      <p:sp>
+        <p:nvSpPr>
+          <p:cNvPr id="6" name="文字方塊 5"/>
+          <p:cNvSpPr txBox="1"/>
+          <p:nvPr/>
+        </p:nvSpPr>
+        <p:spPr>
+          <a:xfrm>
+            <a:off x="487680" y="122400"/>
+            <a:ext cx="2668038" cy="369332"/>
+          </a:xfrm>
+          <a:prstGeom prst="rect">
+            <a:avLst/>
+          </a:prstGeom>
+          <a:noFill/>
+        </p:spPr>
+        <p:txBody>
+          <a:bodyPr wrap="none" rtlCol="0">
+            <a:spAutoFit/>
+          </a:bodyPr>
+          <a:lstStyle/>
+          <a:p>
+            <a:r>
+              <a:rPr lang="en-US" altLang="zh-TW" b="1" dirty="0" smtClean="0">
+                <a:solidFill>
+                  <a:srgbClr val="FF0000"/>
+                </a:solidFill>
+              </a:rPr>
+              <a:t>Shape</a:t>
+            </a:r>
+            <a:r>
+              <a:rPr lang="zh-TW" altLang="en-US" b="1" dirty="0" smtClean="0">
+                <a:solidFill>
+                  <a:srgbClr val="FF0000"/>
+                </a:solidFill>
+              </a:rPr>
+              <a:t> </a:t>
+            </a:r>
+            <a:r>
+              <a:rPr lang="en-US" altLang="zh-TW" b="1" dirty="0" smtClean="0">
+                <a:solidFill>
+                  <a:srgbClr val="FF0000"/>
+                </a:solidFill>
+              </a:rPr>
+              <a:t>context</a:t>
+            </a:r>
+            <a:r>
+              <a:rPr lang="zh-TW" altLang="en-US" b="1" dirty="0" smtClean="0">
+                <a:solidFill>
+                  <a:srgbClr val="FF0000"/>
+                </a:solidFill>
+              </a:rPr>
+              <a:t>做完第一次</a:t>
+            </a:r>
+            <a:endParaRPr lang="zh-TW" altLang="en-US" b="1" dirty="0">
+              <a:solidFill>
+                <a:srgbClr val="FF0000"/>
+              </a:solidFill>
+            </a:endParaRPr>
+          </a:p>
+        </p:txBody>
+      </p:sp>
+      <p:pic>
+        <p:nvPicPr>
+          <p:cNvPr id="8" name="圖片 7"/>
+          <p:cNvPicPr>
+            <a:picLocks noChangeAspect="1"/>
+          </p:cNvPicPr>
+          <p:nvPr/>
+        </p:nvPicPr>
+        <p:blipFill>
+          <a:blip r:embed="rId2"/>
+          <a:stretch>
+            <a:fillRect/>
+          </a:stretch>
+        </p:blipFill>
+        <p:spPr>
+          <a:xfrm>
+            <a:off x="122400" y="608400"/>
+            <a:ext cx="7383780" cy="6023610"/>
+          </a:xfrm>
+          <a:prstGeom prst="rect">
+            <a:avLst/>
+          </a:prstGeom>
+        </p:spPr>
+      </p:pic>
+      <p:pic>
+        <p:nvPicPr>
+          <p:cNvPr id="9" name="圖片 8"/>
+          <p:cNvPicPr>
+            <a:picLocks noChangeAspect="1"/>
+          </p:cNvPicPr>
+          <p:nvPr/>
+        </p:nvPicPr>
+        <p:blipFill>
+          <a:blip r:embed="rId3"/>
+          <a:stretch>
+            <a:fillRect/>
+          </a:stretch>
+        </p:blipFill>
+        <p:spPr>
+          <a:xfrm>
+            <a:off x="5518800" y="122400"/>
+            <a:ext cx="7804404" cy="6501384"/>
+          </a:xfrm>
+          <a:prstGeom prst="rect">
+            <a:avLst/>
+          </a:prstGeom>
+        </p:spPr>
+      </p:pic>
+    </p:spTree>
+    <p:extLst>
+      <p:ext uri="{BB962C8B-B14F-4D97-AF65-F5344CB8AC3E}">
+        <p14:creationId xmlns:p14="http://schemas.microsoft.com/office/powerpoint/2010/main" val="2800183671"/>
+      </p:ext>
+    </p:extLst>
+  </p:cSld>
+  <p:clrMapOvr>
+    <a:masterClrMapping/>
+  </p:clrMapOvr>
+  <p:timing>
+    <p:tnLst>
+      <p:par>
+        <p:cTn id="1" dur="indefinite" restart="never" nodeType="tmRoot"/>
+      </p:par>
+    </p:tnLst>
+  </p:timing>
+</p:sld>
+</file>
+
 <file path=ppt/slides/slide5.xml><?xml version="1.0" encoding="utf-8"?>
 <p:sld xmlns:a="http://schemas.openxmlformats.org/drawingml/2006/main" xmlns:r="http://schemas.openxmlformats.org/officeDocument/2006/relationships" xmlns:p="http://schemas.openxmlformats.org/presentationml/2006/main">
   <p:cSld>
@@ -8776,6 +10603,2408 @@
       <p:bldP spid="10" grpId="0"/>
     </p:bldLst>
   </p:timing>
+</p:sld>
+</file>
+
+<file path=ppt/slides/slide50.xml><?xml version="1.0" encoding="utf-8"?>
+<p:sld xmlns:a="http://schemas.openxmlformats.org/drawingml/2006/main" xmlns:r="http://schemas.openxmlformats.org/officeDocument/2006/relationships" xmlns:p="http://schemas.openxmlformats.org/presentationml/2006/main">
+  <p:cSld>
+    <p:spTree>
+      <p:nvGrpSpPr>
+        <p:cNvPr id="1" name=""/>
+        <p:cNvGrpSpPr/>
+        <p:nvPr/>
+      </p:nvGrpSpPr>
+      <p:grpSpPr>
+        <a:xfrm>
+          <a:off x="0" y="0"/>
+          <a:ext cx="0" cy="0"/>
+          <a:chOff x="0" y="0"/>
+          <a:chExt cx="0" cy="0"/>
+        </a:xfrm>
+      </p:grpSpPr>
+      <p:sp>
+        <p:nvSpPr>
+          <p:cNvPr id="3" name="內容版面配置區 2"/>
+          <p:cNvSpPr>
+            <a:spLocks noGrp="1"/>
+          </p:cNvSpPr>
+          <p:nvPr>
+            <p:ph idx="1"/>
+          </p:nvPr>
+        </p:nvSpPr>
+        <p:spPr/>
+        <p:txBody>
+          <a:bodyPr/>
+          <a:lstStyle/>
+          <a:p>
+            <a:endParaRPr lang="zh-TW" altLang="en-US"/>
+          </a:p>
+        </p:txBody>
+      </p:sp>
+      <p:pic>
+        <p:nvPicPr>
+          <p:cNvPr id="4" name="圖片 3"/>
+          <p:cNvPicPr>
+            <a:picLocks noChangeAspect="1"/>
+          </p:cNvPicPr>
+          <p:nvPr/>
+        </p:nvPicPr>
+        <p:blipFill>
+          <a:blip r:embed="rId2"/>
+          <a:stretch>
+            <a:fillRect/>
+          </a:stretch>
+        </p:blipFill>
+        <p:spPr>
+          <a:xfrm>
+            <a:off x="0" y="619200"/>
+            <a:ext cx="6937248" cy="5693664"/>
+          </a:xfrm>
+          <a:prstGeom prst="rect">
+            <a:avLst/>
+          </a:prstGeom>
+        </p:spPr>
+      </p:pic>
+      <p:pic>
+        <p:nvPicPr>
+          <p:cNvPr id="5" name="圖片 4"/>
+          <p:cNvPicPr>
+            <a:picLocks noChangeAspect="1"/>
+          </p:cNvPicPr>
+          <p:nvPr/>
+        </p:nvPicPr>
+        <p:blipFill>
+          <a:blip r:embed="rId3"/>
+          <a:stretch>
+            <a:fillRect/>
+          </a:stretch>
+        </p:blipFill>
+        <p:spPr>
+          <a:xfrm>
+            <a:off x="7192800" y="2"/>
+            <a:ext cx="5056251" cy="4048506"/>
+          </a:xfrm>
+          <a:prstGeom prst="rect">
+            <a:avLst/>
+          </a:prstGeom>
+        </p:spPr>
+      </p:pic>
+      <p:pic>
+        <p:nvPicPr>
+          <p:cNvPr id="6" name="圖片 5"/>
+          <p:cNvPicPr>
+            <a:picLocks noChangeAspect="1"/>
+          </p:cNvPicPr>
+          <p:nvPr/>
+        </p:nvPicPr>
+        <p:blipFill>
+          <a:blip r:embed="rId4"/>
+          <a:stretch>
+            <a:fillRect/>
+          </a:stretch>
+        </p:blipFill>
+        <p:spPr>
+          <a:xfrm>
+            <a:off x="5241602" y="3009602"/>
+            <a:ext cx="5403247" cy="4394264"/>
+          </a:xfrm>
+          <a:prstGeom prst="rect">
+            <a:avLst/>
+          </a:prstGeom>
+        </p:spPr>
+      </p:pic>
+      <p:sp>
+        <p:nvSpPr>
+          <p:cNvPr id="7" name="文字方塊 6"/>
+          <p:cNvSpPr txBox="1"/>
+          <p:nvPr/>
+        </p:nvSpPr>
+        <p:spPr>
+          <a:xfrm>
+            <a:off x="800586" y="113967"/>
+            <a:ext cx="2668038" cy="369332"/>
+          </a:xfrm>
+          <a:prstGeom prst="rect">
+            <a:avLst/>
+          </a:prstGeom>
+          <a:noFill/>
+        </p:spPr>
+        <p:txBody>
+          <a:bodyPr wrap="none" rtlCol="0">
+            <a:spAutoFit/>
+          </a:bodyPr>
+          <a:lstStyle/>
+          <a:p>
+            <a:r>
+              <a:rPr lang="en-US" altLang="zh-TW" b="1" dirty="0" smtClean="0">
+                <a:solidFill>
+                  <a:srgbClr val="FF0000"/>
+                </a:solidFill>
+              </a:rPr>
+              <a:t>Shape</a:t>
+            </a:r>
+            <a:r>
+              <a:rPr lang="zh-TW" altLang="en-US" b="1" dirty="0" smtClean="0">
+                <a:solidFill>
+                  <a:srgbClr val="FF0000"/>
+                </a:solidFill>
+              </a:rPr>
+              <a:t> </a:t>
+            </a:r>
+            <a:r>
+              <a:rPr lang="en-US" altLang="zh-TW" b="1" dirty="0" smtClean="0">
+                <a:solidFill>
+                  <a:srgbClr val="FF0000"/>
+                </a:solidFill>
+              </a:rPr>
+              <a:t>context</a:t>
+            </a:r>
+            <a:r>
+              <a:rPr lang="zh-TW" altLang="en-US" b="1" dirty="0" smtClean="0">
+                <a:solidFill>
+                  <a:srgbClr val="FF0000"/>
+                </a:solidFill>
+              </a:rPr>
+              <a:t>做完第一次</a:t>
+            </a:r>
+            <a:endParaRPr lang="zh-TW" altLang="en-US" b="1" dirty="0">
+              <a:solidFill>
+                <a:srgbClr val="FF0000"/>
+              </a:solidFill>
+            </a:endParaRPr>
+          </a:p>
+        </p:txBody>
+      </p:sp>
+    </p:spTree>
+    <p:extLst>
+      <p:ext uri="{BB962C8B-B14F-4D97-AF65-F5344CB8AC3E}">
+        <p14:creationId xmlns:p14="http://schemas.microsoft.com/office/powerpoint/2010/main" val="849909304"/>
+      </p:ext>
+    </p:extLst>
+  </p:cSld>
+  <p:clrMapOvr>
+    <a:masterClrMapping/>
+  </p:clrMapOvr>
+  <p:timing>
+    <p:tnLst>
+      <p:par>
+        <p:cTn id="1" dur="indefinite" restart="never" nodeType="tmRoot"/>
+      </p:par>
+    </p:tnLst>
+  </p:timing>
+</p:sld>
+</file>
+
+<file path=ppt/slides/slide51.xml><?xml version="1.0" encoding="utf-8"?>
+<p:sld xmlns:a="http://schemas.openxmlformats.org/drawingml/2006/main" xmlns:r="http://schemas.openxmlformats.org/officeDocument/2006/relationships" xmlns:p="http://schemas.openxmlformats.org/presentationml/2006/main">
+  <p:cSld>
+    <p:spTree>
+      <p:nvGrpSpPr>
+        <p:cNvPr id="1" name=""/>
+        <p:cNvGrpSpPr/>
+        <p:nvPr/>
+      </p:nvGrpSpPr>
+      <p:grpSpPr>
+        <a:xfrm>
+          <a:off x="0" y="0"/>
+          <a:ext cx="0" cy="0"/>
+          <a:chOff x="0" y="0"/>
+          <a:chExt cx="0" cy="0"/>
+        </a:xfrm>
+      </p:grpSpPr>
+      <p:sp>
+        <p:nvSpPr>
+          <p:cNvPr id="2" name="標題 1"/>
+          <p:cNvSpPr>
+            <a:spLocks noGrp="1"/>
+          </p:cNvSpPr>
+          <p:nvPr>
+            <p:ph type="title"/>
+          </p:nvPr>
+        </p:nvSpPr>
+        <p:spPr/>
+        <p:txBody>
+          <a:bodyPr/>
+          <a:lstStyle/>
+          <a:p>
+            <a:endParaRPr lang="zh-TW" altLang="en-US"/>
+          </a:p>
+        </p:txBody>
+      </p:sp>
+      <p:sp>
+        <p:nvSpPr>
+          <p:cNvPr id="3" name="內容版面配置區 2"/>
+          <p:cNvSpPr>
+            <a:spLocks noGrp="1"/>
+          </p:cNvSpPr>
+          <p:nvPr>
+            <p:ph idx="1"/>
+          </p:nvPr>
+        </p:nvSpPr>
+        <p:spPr/>
+        <p:txBody>
+          <a:bodyPr/>
+          <a:lstStyle/>
+          <a:p>
+            <a:endParaRPr lang="zh-TW" altLang="en-US"/>
+          </a:p>
+        </p:txBody>
+      </p:sp>
+      <p:pic>
+        <p:nvPicPr>
+          <p:cNvPr id="4" name="圖片 3"/>
+          <p:cNvPicPr>
+            <a:picLocks noChangeAspect="1"/>
+          </p:cNvPicPr>
+          <p:nvPr/>
+        </p:nvPicPr>
+        <p:blipFill>
+          <a:blip r:embed="rId2"/>
+          <a:stretch>
+            <a:fillRect/>
+          </a:stretch>
+        </p:blipFill>
+        <p:spPr>
+          <a:xfrm>
+            <a:off x="122400" y="608400"/>
+            <a:ext cx="7370826" cy="6049518"/>
+          </a:xfrm>
+          <a:prstGeom prst="rect">
+            <a:avLst/>
+          </a:prstGeom>
+        </p:spPr>
+      </p:pic>
+      <p:pic>
+        <p:nvPicPr>
+          <p:cNvPr id="5" name="圖片 4"/>
+          <p:cNvPicPr>
+            <a:picLocks noChangeAspect="1"/>
+          </p:cNvPicPr>
+          <p:nvPr/>
+        </p:nvPicPr>
+        <p:blipFill>
+          <a:blip r:embed="rId3"/>
+          <a:stretch>
+            <a:fillRect/>
+          </a:stretch>
+        </p:blipFill>
+        <p:spPr>
+          <a:xfrm>
+            <a:off x="5518800" y="122400"/>
+            <a:ext cx="7845552" cy="6556248"/>
+          </a:xfrm>
+          <a:prstGeom prst="rect">
+            <a:avLst/>
+          </a:prstGeom>
+        </p:spPr>
+      </p:pic>
+    </p:spTree>
+    <p:extLst>
+      <p:ext uri="{BB962C8B-B14F-4D97-AF65-F5344CB8AC3E}">
+        <p14:creationId xmlns:p14="http://schemas.microsoft.com/office/powerpoint/2010/main" val="4028441609"/>
+      </p:ext>
+    </p:extLst>
+  </p:cSld>
+  <p:clrMapOvr>
+    <a:masterClrMapping/>
+  </p:clrMapOvr>
+  <p:timing>
+    <p:tnLst>
+      <p:par>
+        <p:cTn id="1" dur="indefinite" restart="never" nodeType="tmRoot"/>
+      </p:par>
+    </p:tnLst>
+  </p:timing>
+</p:sld>
+</file>
+
+<file path=ppt/slides/slide52.xml><?xml version="1.0" encoding="utf-8"?>
+<p:sld xmlns:a="http://schemas.openxmlformats.org/drawingml/2006/main" xmlns:r="http://schemas.openxmlformats.org/officeDocument/2006/relationships" xmlns:p="http://schemas.openxmlformats.org/presentationml/2006/main">
+  <p:cSld>
+    <p:spTree>
+      <p:nvGrpSpPr>
+        <p:cNvPr id="1" name=""/>
+        <p:cNvGrpSpPr/>
+        <p:nvPr/>
+      </p:nvGrpSpPr>
+      <p:grpSpPr>
+        <a:xfrm>
+          <a:off x="0" y="0"/>
+          <a:ext cx="0" cy="0"/>
+          <a:chOff x="0" y="0"/>
+          <a:chExt cx="0" cy="0"/>
+        </a:xfrm>
+      </p:grpSpPr>
+      <p:sp>
+        <p:nvSpPr>
+          <p:cNvPr id="2" name="標題 1"/>
+          <p:cNvSpPr>
+            <a:spLocks noGrp="1"/>
+          </p:cNvSpPr>
+          <p:nvPr>
+            <p:ph type="title"/>
+          </p:nvPr>
+        </p:nvSpPr>
+        <p:spPr/>
+        <p:txBody>
+          <a:bodyPr/>
+          <a:lstStyle/>
+          <a:p>
+            <a:r>
+              <a:rPr lang="zh-TW" altLang="en-US" dirty="0" smtClean="0"/>
+              <a:t>改</a:t>
+            </a:r>
+            <a:r>
+              <a:rPr lang="zh-TW" altLang="en-US" dirty="0"/>
+              <a:t>進</a:t>
+            </a:r>
+          </a:p>
+        </p:txBody>
+      </p:sp>
+      <p:sp>
+        <p:nvSpPr>
+          <p:cNvPr id="3" name="內容版面配置區 2"/>
+          <p:cNvSpPr>
+            <a:spLocks noGrp="1"/>
+          </p:cNvSpPr>
+          <p:nvPr>
+            <p:ph idx="1"/>
+          </p:nvPr>
+        </p:nvSpPr>
+        <p:spPr>
+          <a:xfrm>
+            <a:off x="838199" y="1825624"/>
+            <a:ext cx="11226421" cy="4820835"/>
+          </a:xfrm>
+        </p:spPr>
+        <p:txBody>
+          <a:bodyPr/>
+          <a:lstStyle/>
+          <a:p>
+            <a:r>
+              <a:rPr lang="zh-TW" altLang="en-US" dirty="0" smtClean="0"/>
+              <a:t>將座標</a:t>
+            </a:r>
+            <a:r>
+              <a:rPr lang="zh-TW" altLang="en-US" dirty="0"/>
+              <a:t>餵</a:t>
+            </a:r>
+            <a:r>
+              <a:rPr lang="zh-TW" altLang="en-US" dirty="0" smtClean="0"/>
+              <a:t>入，做</a:t>
+            </a:r>
+            <a:r>
+              <a:rPr lang="en-US" altLang="zh-TW" dirty="0" smtClean="0"/>
+              <a:t>shape</a:t>
+            </a:r>
+            <a:r>
+              <a:rPr lang="zh-TW" altLang="en-US" dirty="0" smtClean="0"/>
+              <a:t> </a:t>
+            </a:r>
+            <a:r>
+              <a:rPr lang="en-US" altLang="zh-TW" dirty="0" smtClean="0"/>
+              <a:t>context</a:t>
+            </a:r>
+          </a:p>
+          <a:p>
+            <a:r>
+              <a:rPr lang="en-US" altLang="zh-TW" dirty="0" smtClean="0"/>
+              <a:t>random</a:t>
+            </a:r>
+            <a:r>
+              <a:rPr lang="zh-TW" altLang="en-US" dirty="0" smtClean="0"/>
+              <a:t>取出三個座標，算出轉換矩陣</a:t>
+            </a:r>
+            <a:endParaRPr lang="en-US" altLang="zh-TW" dirty="0" smtClean="0"/>
+          </a:p>
+          <a:p>
+            <a:r>
+              <a:rPr lang="zh-TW" altLang="en-US" dirty="0" smtClean="0"/>
+              <a:t>將每個座標去乘上轉換矩陣，所得到的座標減去</a:t>
+            </a:r>
+            <a:r>
+              <a:rPr lang="en-US" altLang="zh-TW" dirty="0" smtClean="0"/>
+              <a:t>shape context</a:t>
+            </a:r>
+            <a:r>
+              <a:rPr lang="zh-TW" altLang="en-US" dirty="0" smtClean="0"/>
+              <a:t>對應到</a:t>
+            </a:r>
+            <a:endParaRPr lang="en-US" altLang="zh-TW" dirty="0" smtClean="0"/>
+          </a:p>
+          <a:p>
+            <a:pPr marL="0" indent="0">
+              <a:buNone/>
+            </a:pPr>
+            <a:r>
+              <a:rPr lang="zh-TW" altLang="en-US" dirty="0"/>
+              <a:t> </a:t>
+            </a:r>
+            <a:r>
+              <a:rPr lang="zh-TW" altLang="en-US" dirty="0" smtClean="0"/>
+              <a:t>  的點</a:t>
+            </a:r>
+            <a:r>
+              <a:rPr lang="en-US" altLang="zh-TW" dirty="0" smtClean="0"/>
+              <a:t>(</a:t>
+            </a:r>
+            <a:r>
+              <a:rPr lang="zh-TW" altLang="en-US" dirty="0" smtClean="0"/>
+              <a:t>正解</a:t>
+            </a:r>
+            <a:r>
+              <a:rPr lang="en-US" altLang="zh-TW" dirty="0" smtClean="0"/>
+              <a:t>)</a:t>
+            </a:r>
+          </a:p>
+          <a:p>
+            <a:r>
+              <a:rPr lang="zh-TW" altLang="en-US" dirty="0" smtClean="0"/>
+              <a:t>當距離範圍在</a:t>
+            </a:r>
+            <a:r>
+              <a:rPr lang="en-US" altLang="zh-TW" dirty="0" smtClean="0"/>
+              <a:t>0.05</a:t>
+            </a:r>
+            <a:r>
+              <a:rPr lang="zh-TW" altLang="en-US" dirty="0" smtClean="0"/>
+              <a:t>，我們當作正確答案</a:t>
+            </a:r>
+            <a:endParaRPr lang="en-US" altLang="zh-TW" dirty="0" smtClean="0"/>
+          </a:p>
+          <a:p>
+            <a:r>
+              <a:rPr lang="zh-TW" altLang="en-US" dirty="0" smtClean="0"/>
+              <a:t>錯誤的答案</a:t>
+            </a:r>
+            <a:r>
+              <a:rPr lang="zh-TW" altLang="en-US" dirty="0"/>
+              <a:t>再</a:t>
+            </a:r>
+            <a:r>
+              <a:rPr lang="zh-TW" altLang="en-US" dirty="0" smtClean="0"/>
+              <a:t>跑一次</a:t>
+            </a:r>
+            <a:r>
+              <a:rPr lang="en-US" altLang="zh-TW" dirty="0" smtClean="0"/>
+              <a:t>shape context</a:t>
+            </a:r>
+          </a:p>
+          <a:p>
+            <a:r>
+              <a:rPr lang="zh-TW" altLang="en-US" dirty="0" smtClean="0"/>
+              <a:t>再</a:t>
+            </a:r>
+            <a:r>
+              <a:rPr lang="en-US" altLang="zh-TW" dirty="0" smtClean="0"/>
+              <a:t>random</a:t>
+            </a:r>
+            <a:r>
+              <a:rPr lang="zh-TW" altLang="en-US" dirty="0"/>
+              <a:t>取出三個座標，算出轉換</a:t>
+            </a:r>
+            <a:r>
+              <a:rPr lang="zh-TW" altLang="en-US" dirty="0" smtClean="0"/>
+              <a:t>矩陣</a:t>
+            </a:r>
+            <a:endParaRPr lang="en-US" altLang="zh-TW" dirty="0" smtClean="0"/>
+          </a:p>
+          <a:p>
+            <a:r>
+              <a:rPr lang="zh-TW" altLang="en-US" dirty="0" smtClean="0"/>
+              <a:t>再繼續做第三點、第四</a:t>
+            </a:r>
+            <a:r>
+              <a:rPr lang="zh-TW" altLang="en-US" dirty="0"/>
+              <a:t>點</a:t>
+            </a:r>
+            <a:endParaRPr lang="en-US" altLang="zh-TW" dirty="0"/>
+          </a:p>
+          <a:p>
+            <a:r>
+              <a:rPr lang="en-US" altLang="zh-TW" dirty="0" smtClean="0"/>
+              <a:t>…..</a:t>
+            </a:r>
+            <a:r>
+              <a:rPr lang="zh-TW" altLang="en-US" dirty="0" smtClean="0"/>
+              <a:t>以此類推</a:t>
+            </a:r>
+            <a:endParaRPr lang="zh-TW" altLang="en-US" dirty="0"/>
+          </a:p>
+        </p:txBody>
+      </p:sp>
+    </p:spTree>
+    <p:extLst>
+      <p:ext uri="{BB962C8B-B14F-4D97-AF65-F5344CB8AC3E}">
+        <p14:creationId xmlns:p14="http://schemas.microsoft.com/office/powerpoint/2010/main" val="3995275972"/>
+      </p:ext>
+    </p:extLst>
+  </p:cSld>
+  <p:clrMapOvr>
+    <a:masterClrMapping/>
+  </p:clrMapOvr>
+</p:sld>
+</file>
+
+<file path=ppt/slides/slide53.xml><?xml version="1.0" encoding="utf-8"?>
+<p:sld xmlns:a="http://schemas.openxmlformats.org/drawingml/2006/main" xmlns:r="http://schemas.openxmlformats.org/officeDocument/2006/relationships" xmlns:p="http://schemas.openxmlformats.org/presentationml/2006/main">
+  <p:cSld>
+    <p:spTree>
+      <p:nvGrpSpPr>
+        <p:cNvPr id="1" name=""/>
+        <p:cNvGrpSpPr/>
+        <p:nvPr/>
+      </p:nvGrpSpPr>
+      <p:grpSpPr>
+        <a:xfrm>
+          <a:off x="0" y="0"/>
+          <a:ext cx="0" cy="0"/>
+          <a:chOff x="0" y="0"/>
+          <a:chExt cx="0" cy="0"/>
+        </a:xfrm>
+      </p:grpSpPr>
+      <p:sp>
+        <p:nvSpPr>
+          <p:cNvPr id="2" name="標題 1"/>
+          <p:cNvSpPr>
+            <a:spLocks noGrp="1"/>
+          </p:cNvSpPr>
+          <p:nvPr>
+            <p:ph type="ctrTitle"/>
+          </p:nvPr>
+        </p:nvSpPr>
+        <p:spPr>
+          <a:xfrm>
+            <a:off x="1078173" y="1122363"/>
+            <a:ext cx="10167581" cy="2387600"/>
+          </a:xfrm>
+        </p:spPr>
+        <p:txBody>
+          <a:bodyPr/>
+          <a:lstStyle/>
+          <a:p>
+            <a:r>
+              <a:rPr lang="en-US" altLang="zh-TW" dirty="0" smtClean="0"/>
+              <a:t>Apply RANSAC in Shape Context</a:t>
+            </a:r>
+            <a:endParaRPr lang="zh-TW" altLang="en-US" dirty="0"/>
+          </a:p>
+        </p:txBody>
+      </p:sp>
+      <p:sp>
+        <p:nvSpPr>
+          <p:cNvPr id="3" name="副標題 2"/>
+          <p:cNvSpPr>
+            <a:spLocks noGrp="1"/>
+          </p:cNvSpPr>
+          <p:nvPr>
+            <p:ph type="subTitle" idx="1"/>
+          </p:nvPr>
+        </p:nvSpPr>
+        <p:spPr>
+          <a:xfrm>
+            <a:off x="1524000" y="3602037"/>
+            <a:ext cx="9144000" cy="2484863"/>
+          </a:xfrm>
+        </p:spPr>
+        <p:txBody>
+          <a:bodyPr>
+            <a:normAutofit lnSpcReduction="10000"/>
+          </a:bodyPr>
+          <a:lstStyle/>
+          <a:p>
+            <a:r>
+              <a:rPr lang="en-US" altLang="zh-TW" dirty="0" smtClean="0"/>
+              <a:t>(1)</a:t>
+            </a:r>
+            <a:r>
+              <a:rPr lang="zh-TW" altLang="en-US" dirty="0" smtClean="0"/>
+              <a:t>轉換矩陣只做一次</a:t>
+            </a:r>
+            <a:endParaRPr lang="en-US" altLang="zh-TW" dirty="0" smtClean="0"/>
+          </a:p>
+          <a:p>
+            <a:r>
+              <a:rPr lang="en-US" altLang="zh-TW" dirty="0" smtClean="0"/>
+              <a:t>(2)Voting</a:t>
+            </a:r>
+            <a:r>
+              <a:rPr lang="zh-TW" altLang="en-US" dirty="0" smtClean="0"/>
+              <a:t>後看對的多少錯的多少，</a:t>
+            </a:r>
+            <a:r>
+              <a:rPr lang="en-US" altLang="zh-TW" dirty="0" smtClean="0"/>
+              <a:t>show</a:t>
+            </a:r>
+            <a:r>
+              <a:rPr lang="zh-TW" altLang="en-US" dirty="0" smtClean="0"/>
+              <a:t>出來</a:t>
+            </a:r>
+            <a:endParaRPr lang="en-US" altLang="zh-TW" dirty="0" smtClean="0"/>
+          </a:p>
+          <a:p>
+            <a:r>
+              <a:rPr lang="en-US" altLang="zh-TW" dirty="0" smtClean="0"/>
+              <a:t>(3)</a:t>
+            </a:r>
+            <a:r>
+              <a:rPr lang="zh-TW" altLang="en-US" dirty="0" smtClean="0"/>
+              <a:t>把對的與錯的點存起來</a:t>
+            </a:r>
+            <a:endParaRPr lang="en-US" altLang="zh-TW" dirty="0" smtClean="0"/>
+          </a:p>
+          <a:p>
+            <a:r>
+              <a:rPr lang="en-US" altLang="zh-TW" dirty="0" smtClean="0"/>
+              <a:t>(4)</a:t>
+            </a:r>
+            <a:r>
+              <a:rPr lang="zh-TW" altLang="en-US" dirty="0" smtClean="0"/>
+              <a:t>再跑一次</a:t>
+            </a:r>
+            <a:r>
+              <a:rPr lang="en-US" altLang="zh-TW" dirty="0" smtClean="0"/>
+              <a:t>shape</a:t>
+            </a:r>
+            <a:r>
+              <a:rPr lang="zh-TW" altLang="en-US" dirty="0" smtClean="0"/>
+              <a:t> </a:t>
+            </a:r>
+            <a:r>
+              <a:rPr lang="en-US" altLang="zh-TW" dirty="0" smtClean="0"/>
+              <a:t>context</a:t>
+            </a:r>
+          </a:p>
+          <a:p>
+            <a:r>
+              <a:rPr lang="en-US" altLang="zh-TW" dirty="0" smtClean="0"/>
+              <a:t>(5)</a:t>
+            </a:r>
+            <a:r>
+              <a:rPr lang="zh-TW" altLang="en-US" dirty="0" smtClean="0"/>
+              <a:t>看改善了幾個點</a:t>
+            </a:r>
+            <a:endParaRPr lang="en-US" altLang="zh-TW" dirty="0" smtClean="0"/>
+          </a:p>
+          <a:p>
+            <a:r>
+              <a:rPr lang="zh-TW" altLang="en-US" dirty="0" smtClean="0"/>
+              <a:t>王泰傑</a:t>
+            </a:r>
+            <a:endParaRPr lang="zh-TW" altLang="en-US" dirty="0"/>
+          </a:p>
+        </p:txBody>
+      </p:sp>
+    </p:spTree>
+    <p:extLst>
+      <p:ext uri="{BB962C8B-B14F-4D97-AF65-F5344CB8AC3E}">
+        <p14:creationId xmlns:p14="http://schemas.microsoft.com/office/powerpoint/2010/main" val="1513267702"/>
+      </p:ext>
+    </p:extLst>
+  </p:cSld>
+  <p:clrMapOvr>
+    <a:masterClrMapping/>
+  </p:clrMapOvr>
+  <p:timing>
+    <p:tnLst>
+      <p:par>
+        <p:cTn id="1" dur="indefinite" restart="never" nodeType="tmRoot"/>
+      </p:par>
+    </p:tnLst>
+  </p:timing>
+</p:sld>
+</file>
+
+<file path=ppt/slides/slide54.xml><?xml version="1.0" encoding="utf-8"?>
+<p:sld xmlns:a="http://schemas.openxmlformats.org/drawingml/2006/main" xmlns:r="http://schemas.openxmlformats.org/officeDocument/2006/relationships" xmlns:p="http://schemas.openxmlformats.org/presentationml/2006/main">
+  <p:cSld>
+    <p:spTree>
+      <p:nvGrpSpPr>
+        <p:cNvPr id="1" name=""/>
+        <p:cNvGrpSpPr/>
+        <p:nvPr/>
+      </p:nvGrpSpPr>
+      <p:grpSpPr>
+        <a:xfrm>
+          <a:off x="0" y="0"/>
+          <a:ext cx="0" cy="0"/>
+          <a:chOff x="0" y="0"/>
+          <a:chExt cx="0" cy="0"/>
+        </a:xfrm>
+      </p:grpSpPr>
+      <p:sp>
+        <p:nvSpPr>
+          <p:cNvPr id="2" name="標題 1"/>
+          <p:cNvSpPr>
+            <a:spLocks noGrp="1"/>
+          </p:cNvSpPr>
+          <p:nvPr>
+            <p:ph type="title"/>
+          </p:nvPr>
+        </p:nvSpPr>
+        <p:spPr/>
+        <p:txBody>
+          <a:bodyPr/>
+          <a:lstStyle/>
+          <a:p>
+            <a:endParaRPr lang="zh-TW" altLang="en-US" dirty="0"/>
+          </a:p>
+        </p:txBody>
+      </p:sp>
+      <p:pic>
+        <p:nvPicPr>
+          <p:cNvPr id="4" name="圖片 3"/>
+          <p:cNvPicPr>
+            <a:picLocks noChangeAspect="1"/>
+          </p:cNvPicPr>
+          <p:nvPr/>
+        </p:nvPicPr>
+        <p:blipFill>
+          <a:blip r:embed="rId2"/>
+          <a:stretch>
+            <a:fillRect/>
+          </a:stretch>
+        </p:blipFill>
+        <p:spPr>
+          <a:xfrm>
+            <a:off x="838200" y="3314059"/>
+            <a:ext cx="6135806" cy="2731182"/>
+          </a:xfrm>
+          <a:prstGeom prst="rect">
+            <a:avLst/>
+          </a:prstGeom>
+        </p:spPr>
+      </p:pic>
+      <p:sp>
+        <p:nvSpPr>
+          <p:cNvPr id="5" name="矩形 4"/>
+          <p:cNvSpPr/>
+          <p:nvPr/>
+        </p:nvSpPr>
+        <p:spPr>
+          <a:xfrm>
+            <a:off x="878006" y="2040708"/>
+            <a:ext cx="6096000" cy="923330"/>
+          </a:xfrm>
+          <a:prstGeom prst="rect">
+            <a:avLst/>
+          </a:prstGeom>
+        </p:spPr>
+        <p:txBody>
+          <a:bodyPr>
+            <a:spAutoFit/>
+          </a:bodyPr>
+          <a:lstStyle/>
+          <a:p>
+            <a:r>
+              <a:rPr lang="en-US" altLang="zh-TW" dirty="0" err="1">
+                <a:solidFill>
+                  <a:srgbClr val="000000"/>
+                </a:solidFill>
+                <a:latin typeface="Courier New" panose="02070309020205020404" pitchFamily="49" charset="0"/>
+              </a:rPr>
+              <a:t>in_points</a:t>
+            </a:r>
+            <a:r>
+              <a:rPr lang="en-US" altLang="zh-TW" dirty="0">
+                <a:solidFill>
+                  <a:srgbClr val="000000"/>
+                </a:solidFill>
+                <a:latin typeface="Courier New" panose="02070309020205020404" pitchFamily="49" charset="0"/>
+              </a:rPr>
+              <a:t>=[10 10; 20 20; 30 30 ];</a:t>
+            </a:r>
+          </a:p>
+          <a:p>
+            <a:r>
+              <a:rPr lang="en-US" altLang="zh-TW" dirty="0" err="1">
+                <a:solidFill>
+                  <a:srgbClr val="000000"/>
+                </a:solidFill>
+                <a:latin typeface="Courier New" panose="02070309020205020404" pitchFamily="49" charset="0"/>
+              </a:rPr>
+              <a:t>out_points</a:t>
+            </a:r>
+            <a:r>
+              <a:rPr lang="en-US" altLang="zh-TW" dirty="0">
+                <a:solidFill>
+                  <a:srgbClr val="000000"/>
+                </a:solidFill>
+                <a:latin typeface="Courier New" panose="02070309020205020404" pitchFamily="49" charset="0"/>
+              </a:rPr>
+              <a:t>=[20 20; 20 20;30 30];</a:t>
+            </a:r>
+          </a:p>
+          <a:p>
+            <a:r>
+              <a:rPr lang="en-US" altLang="zh-TW" dirty="0">
+                <a:solidFill>
+                  <a:srgbClr val="000000"/>
+                </a:solidFill>
+                <a:latin typeface="Courier New" panose="02070309020205020404" pitchFamily="49" charset="0"/>
+              </a:rPr>
+              <a:t>T= </a:t>
+            </a:r>
+            <a:r>
+              <a:rPr lang="en-US" altLang="zh-TW" dirty="0" err="1">
+                <a:solidFill>
+                  <a:srgbClr val="000000"/>
+                </a:solidFill>
+                <a:latin typeface="Courier New" panose="02070309020205020404" pitchFamily="49" charset="0"/>
+              </a:rPr>
+              <a:t>maketform</a:t>
+            </a:r>
+            <a:r>
+              <a:rPr lang="en-US" altLang="zh-TW" dirty="0">
+                <a:solidFill>
+                  <a:srgbClr val="000000"/>
+                </a:solidFill>
+                <a:latin typeface="Courier New" panose="02070309020205020404" pitchFamily="49" charset="0"/>
+              </a:rPr>
+              <a:t>(</a:t>
+            </a:r>
+            <a:r>
+              <a:rPr lang="en-US" altLang="zh-TW" dirty="0">
+                <a:solidFill>
+                  <a:srgbClr val="A020F0"/>
+                </a:solidFill>
+                <a:latin typeface="Courier New" panose="02070309020205020404" pitchFamily="49" charset="0"/>
+              </a:rPr>
+              <a:t>'affine'</a:t>
+            </a:r>
+            <a:r>
+              <a:rPr lang="en-US" altLang="zh-TW" dirty="0">
+                <a:solidFill>
+                  <a:srgbClr val="000000"/>
+                </a:solidFill>
+                <a:latin typeface="Courier New" panose="02070309020205020404" pitchFamily="49" charset="0"/>
+              </a:rPr>
+              <a:t>,</a:t>
+            </a:r>
+            <a:r>
+              <a:rPr lang="en-US" altLang="zh-TW" dirty="0" err="1">
+                <a:solidFill>
+                  <a:srgbClr val="000000"/>
+                </a:solidFill>
+                <a:latin typeface="Courier New" panose="02070309020205020404" pitchFamily="49" charset="0"/>
+              </a:rPr>
+              <a:t>in_points,out_points</a:t>
+            </a:r>
+            <a:r>
+              <a:rPr lang="en-US" altLang="zh-TW" dirty="0">
+                <a:solidFill>
+                  <a:srgbClr val="000000"/>
+                </a:solidFill>
+                <a:latin typeface="Courier New" panose="02070309020205020404" pitchFamily="49" charset="0"/>
+              </a:rPr>
+              <a:t>);</a:t>
+            </a:r>
+          </a:p>
+        </p:txBody>
+      </p:sp>
+    </p:spTree>
+    <p:extLst>
+      <p:ext uri="{BB962C8B-B14F-4D97-AF65-F5344CB8AC3E}">
+        <p14:creationId xmlns:p14="http://schemas.microsoft.com/office/powerpoint/2010/main" val="1039770854"/>
+      </p:ext>
+    </p:extLst>
+  </p:cSld>
+  <p:clrMapOvr>
+    <a:masterClrMapping/>
+  </p:clrMapOvr>
+</p:sld>
+</file>
+
+<file path=ppt/slides/slide55.xml><?xml version="1.0" encoding="utf-8"?>
+<p:sld xmlns:a="http://schemas.openxmlformats.org/drawingml/2006/main" xmlns:r="http://schemas.openxmlformats.org/officeDocument/2006/relationships" xmlns:p="http://schemas.openxmlformats.org/presentationml/2006/main">
+  <p:cSld>
+    <p:spTree>
+      <p:nvGrpSpPr>
+        <p:cNvPr id="1" name=""/>
+        <p:cNvGrpSpPr/>
+        <p:nvPr/>
+      </p:nvGrpSpPr>
+      <p:grpSpPr>
+        <a:xfrm>
+          <a:off x="0" y="0"/>
+          <a:ext cx="0" cy="0"/>
+          <a:chOff x="0" y="0"/>
+          <a:chExt cx="0" cy="0"/>
+        </a:xfrm>
+      </p:grpSpPr>
+      <p:sp>
+        <p:nvSpPr>
+          <p:cNvPr id="2" name="標題 1"/>
+          <p:cNvSpPr>
+            <a:spLocks noGrp="1"/>
+          </p:cNvSpPr>
+          <p:nvPr>
+            <p:ph type="title"/>
+          </p:nvPr>
+        </p:nvSpPr>
+        <p:spPr/>
+        <p:txBody>
+          <a:bodyPr/>
+          <a:lstStyle/>
+          <a:p>
+            <a:endParaRPr lang="zh-TW" altLang="en-US"/>
+          </a:p>
+        </p:txBody>
+      </p:sp>
+      <p:pic>
+        <p:nvPicPr>
+          <p:cNvPr id="4" name="圖片 3"/>
+          <p:cNvPicPr>
+            <a:picLocks noChangeAspect="1"/>
+          </p:cNvPicPr>
+          <p:nvPr/>
+        </p:nvPicPr>
+        <p:blipFill>
+          <a:blip r:embed="rId2"/>
+          <a:stretch>
+            <a:fillRect/>
+          </a:stretch>
+        </p:blipFill>
+        <p:spPr>
+          <a:xfrm>
+            <a:off x="838200" y="3796494"/>
+            <a:ext cx="6768415" cy="2904556"/>
+          </a:xfrm>
+          <a:prstGeom prst="rect">
+            <a:avLst/>
+          </a:prstGeom>
+        </p:spPr>
+      </p:pic>
+      <p:sp>
+        <p:nvSpPr>
+          <p:cNvPr id="5" name="矩形 4"/>
+          <p:cNvSpPr/>
+          <p:nvPr/>
+        </p:nvSpPr>
+        <p:spPr>
+          <a:xfrm>
+            <a:off x="838200" y="2404756"/>
+            <a:ext cx="6640774" cy="923330"/>
+          </a:xfrm>
+          <a:prstGeom prst="rect">
+            <a:avLst/>
+          </a:prstGeom>
+        </p:spPr>
+        <p:txBody>
+          <a:bodyPr wrap="square">
+            <a:spAutoFit/>
+          </a:bodyPr>
+          <a:lstStyle/>
+          <a:p>
+            <a:r>
+              <a:rPr lang="en-US" altLang="zh-TW" dirty="0" err="1">
+                <a:solidFill>
+                  <a:srgbClr val="000000"/>
+                </a:solidFill>
+                <a:latin typeface="Courier New" panose="02070309020205020404" pitchFamily="49" charset="0"/>
+              </a:rPr>
+              <a:t>in_points</a:t>
+            </a:r>
+            <a:r>
+              <a:rPr lang="en-US" altLang="zh-TW" dirty="0">
+                <a:solidFill>
+                  <a:srgbClr val="000000"/>
+                </a:solidFill>
+                <a:latin typeface="Courier New" panose="02070309020205020404" pitchFamily="49" charset="0"/>
+              </a:rPr>
+              <a:t>=[10 10; 10 20; 55 55 ;11 11];</a:t>
+            </a:r>
+          </a:p>
+          <a:p>
+            <a:r>
+              <a:rPr lang="en-US" altLang="zh-TW" dirty="0" err="1">
+                <a:solidFill>
+                  <a:srgbClr val="000000"/>
+                </a:solidFill>
+                <a:latin typeface="Courier New" panose="02070309020205020404" pitchFamily="49" charset="0"/>
+              </a:rPr>
+              <a:t>out_points</a:t>
+            </a:r>
+            <a:r>
+              <a:rPr lang="en-US" altLang="zh-TW" dirty="0">
+                <a:solidFill>
+                  <a:srgbClr val="000000"/>
+                </a:solidFill>
+                <a:latin typeface="Courier New" panose="02070309020205020404" pitchFamily="49" charset="0"/>
+              </a:rPr>
+              <a:t>=[20 20; 20 30;65 65; 21 21];</a:t>
+            </a:r>
+          </a:p>
+          <a:p>
+            <a:r>
+              <a:rPr lang="en-US" altLang="zh-TW" dirty="0">
+                <a:solidFill>
+                  <a:srgbClr val="000000"/>
+                </a:solidFill>
+                <a:latin typeface="Courier New" panose="02070309020205020404" pitchFamily="49" charset="0"/>
+              </a:rPr>
+              <a:t>T= </a:t>
+            </a:r>
+            <a:r>
+              <a:rPr lang="en-US" altLang="zh-TW" dirty="0" err="1">
+                <a:solidFill>
+                  <a:srgbClr val="000000"/>
+                </a:solidFill>
+                <a:latin typeface="Courier New" panose="02070309020205020404" pitchFamily="49" charset="0"/>
+              </a:rPr>
+              <a:t>maketform</a:t>
+            </a:r>
+            <a:r>
+              <a:rPr lang="en-US" altLang="zh-TW" dirty="0">
+                <a:solidFill>
+                  <a:srgbClr val="000000"/>
+                </a:solidFill>
+                <a:latin typeface="Courier New" panose="02070309020205020404" pitchFamily="49" charset="0"/>
+              </a:rPr>
+              <a:t>(</a:t>
+            </a:r>
+            <a:r>
+              <a:rPr lang="en-US" altLang="zh-TW" dirty="0">
+                <a:solidFill>
+                  <a:srgbClr val="A020F0"/>
+                </a:solidFill>
+                <a:latin typeface="Courier New" panose="02070309020205020404" pitchFamily="49" charset="0"/>
+              </a:rPr>
+              <a:t>'affine'</a:t>
+            </a:r>
+            <a:r>
+              <a:rPr lang="en-US" altLang="zh-TW" dirty="0">
+                <a:solidFill>
+                  <a:srgbClr val="000000"/>
+                </a:solidFill>
+                <a:latin typeface="Courier New" panose="02070309020205020404" pitchFamily="49" charset="0"/>
+              </a:rPr>
+              <a:t>,</a:t>
+            </a:r>
+            <a:r>
+              <a:rPr lang="en-US" altLang="zh-TW" dirty="0" err="1">
+                <a:solidFill>
+                  <a:srgbClr val="000000"/>
+                </a:solidFill>
+                <a:latin typeface="Courier New" panose="02070309020205020404" pitchFamily="49" charset="0"/>
+              </a:rPr>
+              <a:t>in_points,out_points</a:t>
+            </a:r>
+            <a:r>
+              <a:rPr lang="en-US" altLang="zh-TW" dirty="0">
+                <a:solidFill>
+                  <a:srgbClr val="000000"/>
+                </a:solidFill>
+                <a:latin typeface="Courier New" panose="02070309020205020404" pitchFamily="49" charset="0"/>
+              </a:rPr>
+              <a:t>);</a:t>
+            </a:r>
+          </a:p>
+        </p:txBody>
+      </p:sp>
+    </p:spTree>
+    <p:extLst>
+      <p:ext uri="{BB962C8B-B14F-4D97-AF65-F5344CB8AC3E}">
+        <p14:creationId xmlns:p14="http://schemas.microsoft.com/office/powerpoint/2010/main" val="2221292891"/>
+      </p:ext>
+    </p:extLst>
+  </p:cSld>
+  <p:clrMapOvr>
+    <a:masterClrMapping/>
+  </p:clrMapOvr>
+</p:sld>
+</file>
+
+<file path=ppt/slides/slide56.xml><?xml version="1.0" encoding="utf-8"?>
+<p:sld xmlns:a="http://schemas.openxmlformats.org/drawingml/2006/main" xmlns:r="http://schemas.openxmlformats.org/officeDocument/2006/relationships" xmlns:p="http://schemas.openxmlformats.org/presentationml/2006/main">
+  <p:cSld>
+    <p:spTree>
+      <p:nvGrpSpPr>
+        <p:cNvPr id="1" name=""/>
+        <p:cNvGrpSpPr/>
+        <p:nvPr/>
+      </p:nvGrpSpPr>
+      <p:grpSpPr>
+        <a:xfrm>
+          <a:off x="0" y="0"/>
+          <a:ext cx="0" cy="0"/>
+          <a:chOff x="0" y="0"/>
+          <a:chExt cx="0" cy="0"/>
+        </a:xfrm>
+      </p:grpSpPr>
+      <p:sp>
+        <p:nvSpPr>
+          <p:cNvPr id="2" name="標題 1"/>
+          <p:cNvSpPr>
+            <a:spLocks noGrp="1"/>
+          </p:cNvSpPr>
+          <p:nvPr>
+            <p:ph type="title"/>
+          </p:nvPr>
+        </p:nvSpPr>
+        <p:spPr/>
+        <p:txBody>
+          <a:bodyPr/>
+          <a:lstStyle/>
+          <a:p>
+            <a:endParaRPr lang="zh-TW" altLang="en-US"/>
+          </a:p>
+        </p:txBody>
+      </p:sp>
+      <p:sp>
+        <p:nvSpPr>
+          <p:cNvPr id="3" name="內容版面配置區 2"/>
+          <p:cNvSpPr>
+            <a:spLocks noGrp="1"/>
+          </p:cNvSpPr>
+          <p:nvPr>
+            <p:ph idx="1"/>
+          </p:nvPr>
+        </p:nvSpPr>
+        <p:spPr/>
+        <p:txBody>
+          <a:bodyPr/>
+          <a:lstStyle/>
+          <a:p>
+            <a:endParaRPr lang="zh-TW" altLang="en-US"/>
+          </a:p>
+        </p:txBody>
+      </p:sp>
+      <p:pic>
+        <p:nvPicPr>
+          <p:cNvPr id="4" name="圖片 3"/>
+          <p:cNvPicPr>
+            <a:picLocks noChangeAspect="1"/>
+          </p:cNvPicPr>
+          <p:nvPr/>
+        </p:nvPicPr>
+        <p:blipFill>
+          <a:blip r:embed="rId2"/>
+          <a:stretch>
+            <a:fillRect/>
+          </a:stretch>
+        </p:blipFill>
+        <p:spPr>
+          <a:xfrm>
+            <a:off x="590550" y="1138877"/>
+            <a:ext cx="5505450" cy="4552950"/>
+          </a:xfrm>
+          <a:prstGeom prst="rect">
+            <a:avLst/>
+          </a:prstGeom>
+        </p:spPr>
+      </p:pic>
+      <p:pic>
+        <p:nvPicPr>
+          <p:cNvPr id="5" name="圖片 4"/>
+          <p:cNvPicPr>
+            <a:picLocks noChangeAspect="1"/>
+          </p:cNvPicPr>
+          <p:nvPr/>
+        </p:nvPicPr>
+        <p:blipFill>
+          <a:blip r:embed="rId3"/>
+          <a:stretch>
+            <a:fillRect/>
+          </a:stretch>
+        </p:blipFill>
+        <p:spPr>
+          <a:xfrm>
+            <a:off x="6343650" y="1138877"/>
+            <a:ext cx="5534025" cy="4514850"/>
+          </a:xfrm>
+          <a:prstGeom prst="rect">
+            <a:avLst/>
+          </a:prstGeom>
+        </p:spPr>
+      </p:pic>
+    </p:spTree>
+    <p:extLst>
+      <p:ext uri="{BB962C8B-B14F-4D97-AF65-F5344CB8AC3E}">
+        <p14:creationId xmlns:p14="http://schemas.microsoft.com/office/powerpoint/2010/main" val="4018155958"/>
+      </p:ext>
+    </p:extLst>
+  </p:cSld>
+  <p:clrMapOvr>
+    <a:masterClrMapping/>
+  </p:clrMapOvr>
+</p:sld>
+</file>
+
+<file path=ppt/slides/slide57.xml><?xml version="1.0" encoding="utf-8"?>
+<p:sld xmlns:a="http://schemas.openxmlformats.org/drawingml/2006/main" xmlns:r="http://schemas.openxmlformats.org/officeDocument/2006/relationships" xmlns:p="http://schemas.openxmlformats.org/presentationml/2006/main">
+  <p:cSld>
+    <p:spTree>
+      <p:nvGrpSpPr>
+        <p:cNvPr id="1" name=""/>
+        <p:cNvGrpSpPr/>
+        <p:nvPr/>
+      </p:nvGrpSpPr>
+      <p:grpSpPr>
+        <a:xfrm>
+          <a:off x="0" y="0"/>
+          <a:ext cx="0" cy="0"/>
+          <a:chOff x="0" y="0"/>
+          <a:chExt cx="0" cy="0"/>
+        </a:xfrm>
+      </p:grpSpPr>
+      <p:sp>
+        <p:nvSpPr>
+          <p:cNvPr id="2" name="標題 1"/>
+          <p:cNvSpPr>
+            <a:spLocks noGrp="1"/>
+          </p:cNvSpPr>
+          <p:nvPr>
+            <p:ph type="title"/>
+          </p:nvPr>
+        </p:nvSpPr>
+        <p:spPr/>
+        <p:txBody>
+          <a:bodyPr/>
+          <a:lstStyle/>
+          <a:p>
+            <a:endParaRPr lang="zh-TW" altLang="en-US"/>
+          </a:p>
+        </p:txBody>
+      </p:sp>
+      <p:sp>
+        <p:nvSpPr>
+          <p:cNvPr id="3" name="內容版面配置區 2"/>
+          <p:cNvSpPr>
+            <a:spLocks noGrp="1"/>
+          </p:cNvSpPr>
+          <p:nvPr>
+            <p:ph idx="1"/>
+          </p:nvPr>
+        </p:nvSpPr>
+        <p:spPr/>
+        <p:txBody>
+          <a:bodyPr/>
+          <a:lstStyle/>
+          <a:p>
+            <a:endParaRPr lang="zh-TW" altLang="en-US"/>
+          </a:p>
+        </p:txBody>
+      </p:sp>
+      <p:pic>
+        <p:nvPicPr>
+          <p:cNvPr id="4" name="圖片 3"/>
+          <p:cNvPicPr>
+            <a:picLocks noChangeAspect="1"/>
+          </p:cNvPicPr>
+          <p:nvPr/>
+        </p:nvPicPr>
+        <p:blipFill>
+          <a:blip r:embed="rId2"/>
+          <a:stretch>
+            <a:fillRect/>
+          </a:stretch>
+        </p:blipFill>
+        <p:spPr>
+          <a:xfrm>
+            <a:off x="266700" y="1150736"/>
+            <a:ext cx="5610225" cy="4467225"/>
+          </a:xfrm>
+          <a:prstGeom prst="rect">
+            <a:avLst/>
+          </a:prstGeom>
+        </p:spPr>
+      </p:pic>
+      <p:pic>
+        <p:nvPicPr>
+          <p:cNvPr id="5" name="圖片 4"/>
+          <p:cNvPicPr>
+            <a:picLocks noChangeAspect="1"/>
+          </p:cNvPicPr>
+          <p:nvPr/>
+        </p:nvPicPr>
+        <p:blipFill>
+          <a:blip r:embed="rId3"/>
+          <a:stretch>
+            <a:fillRect/>
+          </a:stretch>
+        </p:blipFill>
+        <p:spPr>
+          <a:xfrm>
+            <a:off x="6715125" y="1595438"/>
+            <a:ext cx="5476875" cy="4324350"/>
+          </a:xfrm>
+          <a:prstGeom prst="rect">
+            <a:avLst/>
+          </a:prstGeom>
+        </p:spPr>
+      </p:pic>
+    </p:spTree>
+    <p:extLst>
+      <p:ext uri="{BB962C8B-B14F-4D97-AF65-F5344CB8AC3E}">
+        <p14:creationId xmlns:p14="http://schemas.microsoft.com/office/powerpoint/2010/main" val="16823447"/>
+      </p:ext>
+    </p:extLst>
+  </p:cSld>
+  <p:clrMapOvr>
+    <a:masterClrMapping/>
+  </p:clrMapOvr>
+</p:sld>
+</file>
+
+<file path=ppt/slides/slide58.xml><?xml version="1.0" encoding="utf-8"?>
+<p:sld xmlns:a="http://schemas.openxmlformats.org/drawingml/2006/main" xmlns:r="http://schemas.openxmlformats.org/officeDocument/2006/relationships" xmlns:p="http://schemas.openxmlformats.org/presentationml/2006/main">
+  <p:cSld>
+    <p:spTree>
+      <p:nvGrpSpPr>
+        <p:cNvPr id="1" name=""/>
+        <p:cNvGrpSpPr/>
+        <p:nvPr/>
+      </p:nvGrpSpPr>
+      <p:grpSpPr>
+        <a:xfrm>
+          <a:off x="0" y="0"/>
+          <a:ext cx="0" cy="0"/>
+          <a:chOff x="0" y="0"/>
+          <a:chExt cx="0" cy="0"/>
+        </a:xfrm>
+      </p:grpSpPr>
+      <p:sp>
+        <p:nvSpPr>
+          <p:cNvPr id="2" name="標題 1"/>
+          <p:cNvSpPr>
+            <a:spLocks noGrp="1"/>
+          </p:cNvSpPr>
+          <p:nvPr>
+            <p:ph type="title"/>
+          </p:nvPr>
+        </p:nvSpPr>
+        <p:spPr/>
+        <p:txBody>
+          <a:bodyPr/>
+          <a:lstStyle/>
+          <a:p>
+            <a:endParaRPr lang="zh-TW" altLang="en-US"/>
+          </a:p>
+        </p:txBody>
+      </p:sp>
+      <p:sp>
+        <p:nvSpPr>
+          <p:cNvPr id="4" name="矩形 3"/>
+          <p:cNvSpPr/>
+          <p:nvPr/>
+        </p:nvSpPr>
+        <p:spPr>
+          <a:xfrm>
+            <a:off x="388961" y="2781221"/>
+            <a:ext cx="1760562" cy="750627"/>
+          </a:xfrm>
+          <a:prstGeom prst="rect">
+            <a:avLst/>
+          </a:prstGeom>
+          <a:noFill/>
+        </p:spPr>
+        <p:style>
+          <a:lnRef idx="2">
+            <a:schemeClr val="accent1">
+              <a:shade val="50000"/>
+            </a:schemeClr>
+          </a:lnRef>
+          <a:fillRef idx="1">
+            <a:schemeClr val="accent1"/>
+          </a:fillRef>
+          <a:effectRef idx="0">
+            <a:schemeClr val="accent1"/>
+          </a:effectRef>
+          <a:fontRef idx="minor">
+            <a:schemeClr val="lt1"/>
+          </a:fontRef>
+        </p:style>
+        <p:txBody>
+          <a:bodyPr rtlCol="0" anchor="ctr"/>
+          <a:lstStyle/>
+          <a:p>
+            <a:pPr algn="ctr"/>
+            <a:r>
+              <a:rPr lang="zh-TW" altLang="en-US" dirty="0" smtClean="0">
+                <a:solidFill>
+                  <a:srgbClr val="FF0000"/>
+                </a:solidFill>
+              </a:rPr>
+              <a:t>做</a:t>
+            </a:r>
+            <a:r>
+              <a:rPr lang="en-US" altLang="zh-TW" dirty="0" smtClean="0">
+                <a:solidFill>
+                  <a:srgbClr val="FF0000"/>
+                </a:solidFill>
+              </a:rPr>
+              <a:t>Shape context</a:t>
+            </a:r>
+            <a:endParaRPr lang="zh-TW" altLang="en-US" dirty="0">
+              <a:solidFill>
+                <a:srgbClr val="FF0000"/>
+              </a:solidFill>
+            </a:endParaRPr>
+          </a:p>
+        </p:txBody>
+      </p:sp>
+      <p:sp>
+        <p:nvSpPr>
+          <p:cNvPr id="5" name="矩形 4"/>
+          <p:cNvSpPr/>
+          <p:nvPr/>
+        </p:nvSpPr>
+        <p:spPr>
+          <a:xfrm>
+            <a:off x="3455157" y="2781221"/>
+            <a:ext cx="1760562" cy="750627"/>
+          </a:xfrm>
+          <a:prstGeom prst="rect">
+            <a:avLst/>
+          </a:prstGeom>
+          <a:noFill/>
+        </p:spPr>
+        <p:style>
+          <a:lnRef idx="2">
+            <a:schemeClr val="accent1">
+              <a:shade val="50000"/>
+            </a:schemeClr>
+          </a:lnRef>
+          <a:fillRef idx="1">
+            <a:schemeClr val="accent1"/>
+          </a:fillRef>
+          <a:effectRef idx="0">
+            <a:schemeClr val="accent1"/>
+          </a:effectRef>
+          <a:fontRef idx="minor">
+            <a:schemeClr val="lt1"/>
+          </a:fontRef>
+        </p:style>
+        <p:txBody>
+          <a:bodyPr rtlCol="0" anchor="ctr"/>
+          <a:lstStyle/>
+          <a:p>
+            <a:pPr algn="ctr"/>
+            <a:r>
+              <a:rPr lang="zh-TW" altLang="en-US" dirty="0" smtClean="0">
+                <a:solidFill>
+                  <a:srgbClr val="FF0000"/>
+                </a:solidFill>
+              </a:rPr>
+              <a:t>找到兩張圖最佳對應</a:t>
+            </a:r>
+            <a:r>
+              <a:rPr lang="zh-TW" altLang="en-US" dirty="0">
+                <a:solidFill>
+                  <a:srgbClr val="FF0000"/>
+                </a:solidFill>
+              </a:rPr>
+              <a:t>點</a:t>
+            </a:r>
+          </a:p>
+        </p:txBody>
+      </p:sp>
+      <p:cxnSp>
+        <p:nvCxnSpPr>
+          <p:cNvPr id="7" name="直線單箭頭接點 6"/>
+          <p:cNvCxnSpPr>
+            <a:stCxn id="4" idx="3"/>
+            <a:endCxn id="5" idx="1"/>
+          </p:cNvCxnSpPr>
+          <p:nvPr/>
+        </p:nvCxnSpPr>
+        <p:spPr>
+          <a:xfrm>
+            <a:off x="2149523" y="3156535"/>
+            <a:ext cx="1305634" cy="0"/>
+          </a:xfrm>
+          <a:prstGeom prst="straightConnector1">
+            <a:avLst/>
+          </a:prstGeom>
+          <a:ln>
+            <a:tailEnd type="triangle"/>
+          </a:ln>
+        </p:spPr>
+        <p:style>
+          <a:lnRef idx="1">
+            <a:schemeClr val="accent1"/>
+          </a:lnRef>
+          <a:fillRef idx="0">
+            <a:schemeClr val="accent1"/>
+          </a:fillRef>
+          <a:effectRef idx="0">
+            <a:schemeClr val="accent1"/>
+          </a:effectRef>
+          <a:fontRef idx="minor">
+            <a:schemeClr val="tx1"/>
+          </a:fontRef>
+        </p:style>
+      </p:cxnSp>
+      <p:sp>
+        <p:nvSpPr>
+          <p:cNvPr id="9" name="文字方塊 8"/>
+          <p:cNvSpPr txBox="1"/>
+          <p:nvPr/>
+        </p:nvSpPr>
+        <p:spPr>
+          <a:xfrm>
+            <a:off x="2149523" y="2781221"/>
+            <a:ext cx="1338828" cy="646331"/>
+          </a:xfrm>
+          <a:prstGeom prst="rect">
+            <a:avLst/>
+          </a:prstGeom>
+          <a:noFill/>
+        </p:spPr>
+        <p:txBody>
+          <a:bodyPr wrap="none" rtlCol="0">
+            <a:spAutoFit/>
+          </a:bodyPr>
+          <a:lstStyle/>
+          <a:p>
+            <a:r>
+              <a:rPr lang="zh-TW" altLang="en-US" dirty="0" smtClean="0"/>
+              <a:t>透過匈牙利</a:t>
+            </a:r>
+            <a:endParaRPr lang="en-US" altLang="zh-TW" dirty="0" smtClean="0"/>
+          </a:p>
+          <a:p>
+            <a:r>
+              <a:rPr lang="zh-TW" altLang="en-US" dirty="0" smtClean="0"/>
+              <a:t>演算法</a:t>
+            </a:r>
+            <a:endParaRPr lang="zh-TW" altLang="en-US" dirty="0"/>
+          </a:p>
+        </p:txBody>
+      </p:sp>
+      <p:sp>
+        <p:nvSpPr>
+          <p:cNvPr id="13" name="矩形 12"/>
+          <p:cNvSpPr/>
+          <p:nvPr/>
+        </p:nvSpPr>
+        <p:spPr>
+          <a:xfrm>
+            <a:off x="6930786" y="2781220"/>
+            <a:ext cx="1760562" cy="750627"/>
+          </a:xfrm>
+          <a:prstGeom prst="rect">
+            <a:avLst/>
+          </a:prstGeom>
+          <a:noFill/>
+        </p:spPr>
+        <p:style>
+          <a:lnRef idx="2">
+            <a:schemeClr val="accent1">
+              <a:shade val="50000"/>
+            </a:schemeClr>
+          </a:lnRef>
+          <a:fillRef idx="1">
+            <a:schemeClr val="accent1"/>
+          </a:fillRef>
+          <a:effectRef idx="0">
+            <a:schemeClr val="accent1"/>
+          </a:effectRef>
+          <a:fontRef idx="minor">
+            <a:schemeClr val="lt1"/>
+          </a:fontRef>
+        </p:style>
+        <p:txBody>
+          <a:bodyPr rtlCol="0" anchor="ctr"/>
+          <a:lstStyle/>
+          <a:p>
+            <a:pPr algn="ctr"/>
+            <a:r>
+              <a:rPr lang="en-US" altLang="zh-TW" dirty="0" smtClean="0">
+                <a:solidFill>
+                  <a:srgbClr val="FF0000"/>
+                </a:solidFill>
+              </a:rPr>
+              <a:t>Voting</a:t>
+            </a:r>
+            <a:endParaRPr lang="zh-TW" altLang="en-US" dirty="0">
+              <a:solidFill>
+                <a:srgbClr val="FF0000"/>
+              </a:solidFill>
+            </a:endParaRPr>
+          </a:p>
+        </p:txBody>
+      </p:sp>
+      <p:cxnSp>
+        <p:nvCxnSpPr>
+          <p:cNvPr id="15" name="直線單箭頭接點 14"/>
+          <p:cNvCxnSpPr>
+            <a:stCxn id="5" idx="3"/>
+            <a:endCxn id="13" idx="1"/>
+          </p:cNvCxnSpPr>
+          <p:nvPr/>
+        </p:nvCxnSpPr>
+        <p:spPr>
+          <a:xfrm flipV="1">
+            <a:off x="5215719" y="3156534"/>
+            <a:ext cx="1715067" cy="1"/>
+          </a:xfrm>
+          <a:prstGeom prst="straightConnector1">
+            <a:avLst/>
+          </a:prstGeom>
+          <a:ln>
+            <a:tailEnd type="triangle"/>
+          </a:ln>
+        </p:spPr>
+        <p:style>
+          <a:lnRef idx="1">
+            <a:schemeClr val="accent1"/>
+          </a:lnRef>
+          <a:fillRef idx="0">
+            <a:schemeClr val="accent1"/>
+          </a:fillRef>
+          <a:effectRef idx="0">
+            <a:schemeClr val="accent1"/>
+          </a:effectRef>
+          <a:fontRef idx="minor">
+            <a:schemeClr val="tx1"/>
+          </a:fontRef>
+        </p:style>
+      </p:cxnSp>
+      <p:sp>
+        <p:nvSpPr>
+          <p:cNvPr id="17" name="文字方塊 16"/>
+          <p:cNvSpPr txBox="1"/>
+          <p:nvPr/>
+        </p:nvSpPr>
+        <p:spPr>
+          <a:xfrm>
+            <a:off x="10363200" y="3959308"/>
+            <a:ext cx="1828800" cy="646331"/>
+          </a:xfrm>
+          <a:prstGeom prst="rect">
+            <a:avLst/>
+          </a:prstGeom>
+          <a:noFill/>
+        </p:spPr>
+        <p:txBody>
+          <a:bodyPr wrap="square" rtlCol="0">
+            <a:spAutoFit/>
+          </a:bodyPr>
+          <a:lstStyle/>
+          <a:p>
+            <a:r>
+              <a:rPr lang="zh-TW" altLang="en-US" dirty="0" smtClean="0"/>
+              <a:t>設定</a:t>
+            </a:r>
+            <a:r>
+              <a:rPr lang="en-US" altLang="zh-TW" dirty="0" smtClean="0"/>
+              <a:t>threshold=0.05</a:t>
+            </a:r>
+            <a:endParaRPr lang="zh-TW" altLang="en-US" dirty="0"/>
+          </a:p>
+        </p:txBody>
+      </p:sp>
+      <p:sp>
+        <p:nvSpPr>
+          <p:cNvPr id="19" name="矩形 18"/>
+          <p:cNvSpPr/>
+          <p:nvPr/>
+        </p:nvSpPr>
+        <p:spPr>
+          <a:xfrm>
+            <a:off x="10197826" y="2781220"/>
+            <a:ext cx="1760562" cy="750627"/>
+          </a:xfrm>
+          <a:prstGeom prst="rect">
+            <a:avLst/>
+          </a:prstGeom>
+          <a:noFill/>
+        </p:spPr>
+        <p:style>
+          <a:lnRef idx="2">
+            <a:schemeClr val="accent1">
+              <a:shade val="50000"/>
+            </a:schemeClr>
+          </a:lnRef>
+          <a:fillRef idx="1">
+            <a:schemeClr val="accent1"/>
+          </a:fillRef>
+          <a:effectRef idx="0">
+            <a:schemeClr val="accent1"/>
+          </a:effectRef>
+          <a:fontRef idx="minor">
+            <a:schemeClr val="lt1"/>
+          </a:fontRef>
+        </p:style>
+        <p:txBody>
+          <a:bodyPr rtlCol="0" anchor="ctr"/>
+          <a:lstStyle/>
+          <a:p>
+            <a:pPr algn="ctr"/>
+            <a:r>
+              <a:rPr lang="zh-TW" altLang="en-US" dirty="0" smtClean="0">
+                <a:solidFill>
+                  <a:srgbClr val="FF0000"/>
+                </a:solidFill>
+              </a:rPr>
+              <a:t>算距離</a:t>
+            </a:r>
+            <a:endParaRPr lang="zh-TW" altLang="en-US" dirty="0">
+              <a:solidFill>
+                <a:srgbClr val="FF0000"/>
+              </a:solidFill>
+            </a:endParaRPr>
+          </a:p>
+        </p:txBody>
+      </p:sp>
+      <p:sp>
+        <p:nvSpPr>
+          <p:cNvPr id="22" name="文字方塊 21"/>
+          <p:cNvSpPr txBox="1"/>
+          <p:nvPr/>
+        </p:nvSpPr>
+        <p:spPr>
+          <a:xfrm>
+            <a:off x="5307964" y="2781220"/>
+            <a:ext cx="1576072" cy="923330"/>
+          </a:xfrm>
+          <a:prstGeom prst="rect">
+            <a:avLst/>
+          </a:prstGeom>
+          <a:noFill/>
+        </p:spPr>
+        <p:txBody>
+          <a:bodyPr wrap="none" rtlCol="0">
+            <a:spAutoFit/>
+          </a:bodyPr>
+          <a:lstStyle/>
+          <a:p>
+            <a:r>
+              <a:rPr lang="zh-TW" altLang="en-US" dirty="0" smtClean="0"/>
+              <a:t>透過</a:t>
+            </a:r>
+            <a:r>
+              <a:rPr lang="en-US" altLang="zh-TW" dirty="0" smtClean="0"/>
+              <a:t>random</a:t>
+            </a:r>
+          </a:p>
+          <a:p>
+            <a:r>
+              <a:rPr lang="zh-TW" altLang="en-US" dirty="0" smtClean="0"/>
+              <a:t>從</a:t>
+            </a:r>
+            <a:r>
+              <a:rPr lang="en-US" altLang="zh-TW" dirty="0" smtClean="0"/>
+              <a:t>2197</a:t>
+            </a:r>
+            <a:r>
+              <a:rPr lang="zh-TW" altLang="en-US" dirty="0" smtClean="0"/>
+              <a:t>組找出</a:t>
+            </a:r>
+            <a:endParaRPr lang="en-US" altLang="zh-TW" dirty="0" smtClean="0"/>
+          </a:p>
+          <a:p>
+            <a:r>
+              <a:rPr lang="zh-TW" altLang="en-US" dirty="0" smtClean="0"/>
+              <a:t>最好轉換矩陣</a:t>
+            </a:r>
+            <a:endParaRPr lang="zh-TW" altLang="en-US" dirty="0"/>
+          </a:p>
+        </p:txBody>
+      </p:sp>
+      <p:cxnSp>
+        <p:nvCxnSpPr>
+          <p:cNvPr id="25" name="直線單箭頭接點 24"/>
+          <p:cNvCxnSpPr>
+            <a:stCxn id="13" idx="3"/>
+            <a:endCxn id="19" idx="1"/>
+          </p:cNvCxnSpPr>
+          <p:nvPr/>
+        </p:nvCxnSpPr>
+        <p:spPr>
+          <a:xfrm>
+            <a:off x="8691348" y="3156534"/>
+            <a:ext cx="1506478" cy="0"/>
+          </a:xfrm>
+          <a:prstGeom prst="straightConnector1">
+            <a:avLst/>
+          </a:prstGeom>
+          <a:ln>
+            <a:tailEnd type="triangle"/>
+          </a:ln>
+        </p:spPr>
+        <p:style>
+          <a:lnRef idx="1">
+            <a:schemeClr val="accent1"/>
+          </a:lnRef>
+          <a:fillRef idx="0">
+            <a:schemeClr val="accent1"/>
+          </a:fillRef>
+          <a:effectRef idx="0">
+            <a:schemeClr val="accent1"/>
+          </a:effectRef>
+          <a:fontRef idx="minor">
+            <a:schemeClr val="tx1"/>
+          </a:fontRef>
+        </p:style>
+      </p:cxnSp>
+      <p:sp>
+        <p:nvSpPr>
+          <p:cNvPr id="28" name="文字方塊 27"/>
+          <p:cNvSpPr txBox="1"/>
+          <p:nvPr/>
+        </p:nvSpPr>
+        <p:spPr>
+          <a:xfrm>
+            <a:off x="8658154" y="2833367"/>
+            <a:ext cx="1572866" cy="646331"/>
+          </a:xfrm>
+          <a:prstGeom prst="rect">
+            <a:avLst/>
+          </a:prstGeom>
+          <a:noFill/>
+        </p:spPr>
+        <p:txBody>
+          <a:bodyPr wrap="none" rtlCol="0">
+            <a:spAutoFit/>
+          </a:bodyPr>
+          <a:lstStyle/>
+          <a:p>
+            <a:r>
+              <a:rPr lang="zh-TW" altLang="en-US" dirty="0" smtClean="0"/>
+              <a:t>剩下</a:t>
+            </a:r>
+            <a:r>
+              <a:rPr lang="en-US" altLang="zh-TW" dirty="0" smtClean="0"/>
+              <a:t>95</a:t>
+            </a:r>
+            <a:r>
+              <a:rPr lang="zh-TW" altLang="en-US" dirty="0" smtClean="0"/>
+              <a:t>點去乘</a:t>
+            </a:r>
+            <a:endParaRPr lang="en-US" altLang="zh-TW" dirty="0" smtClean="0"/>
+          </a:p>
+          <a:p>
+            <a:r>
+              <a:rPr lang="zh-TW" altLang="en-US" dirty="0" smtClean="0"/>
+              <a:t>上轉換矩陣</a:t>
+            </a:r>
+            <a:endParaRPr lang="zh-TW" altLang="en-US" dirty="0"/>
+          </a:p>
+        </p:txBody>
+      </p:sp>
+      <p:cxnSp>
+        <p:nvCxnSpPr>
+          <p:cNvPr id="31" name="直線單箭頭接點 30"/>
+          <p:cNvCxnSpPr>
+            <a:stCxn id="19" idx="2"/>
+            <a:endCxn id="32" idx="0"/>
+          </p:cNvCxnSpPr>
+          <p:nvPr/>
+        </p:nvCxnSpPr>
+        <p:spPr>
+          <a:xfrm>
+            <a:off x="11078107" y="3531847"/>
+            <a:ext cx="0" cy="1142679"/>
+          </a:xfrm>
+          <a:prstGeom prst="straightConnector1">
+            <a:avLst/>
+          </a:prstGeom>
+          <a:ln>
+            <a:tailEnd type="triangle"/>
+          </a:ln>
+        </p:spPr>
+        <p:style>
+          <a:lnRef idx="1">
+            <a:schemeClr val="accent1"/>
+          </a:lnRef>
+          <a:fillRef idx="0">
+            <a:schemeClr val="accent1"/>
+          </a:fillRef>
+          <a:effectRef idx="0">
+            <a:schemeClr val="accent1"/>
+          </a:effectRef>
+          <a:fontRef idx="minor">
+            <a:schemeClr val="tx1"/>
+          </a:fontRef>
+        </p:style>
+      </p:cxnSp>
+      <p:sp>
+        <p:nvSpPr>
+          <p:cNvPr id="32" name="矩形 31"/>
+          <p:cNvSpPr/>
+          <p:nvPr/>
+        </p:nvSpPr>
+        <p:spPr>
+          <a:xfrm>
+            <a:off x="10197826" y="4674526"/>
+            <a:ext cx="1760562" cy="750627"/>
+          </a:xfrm>
+          <a:prstGeom prst="rect">
+            <a:avLst/>
+          </a:prstGeom>
+          <a:noFill/>
+        </p:spPr>
+        <p:style>
+          <a:lnRef idx="2">
+            <a:schemeClr val="accent1">
+              <a:shade val="50000"/>
+            </a:schemeClr>
+          </a:lnRef>
+          <a:fillRef idx="1">
+            <a:schemeClr val="accent1"/>
+          </a:fillRef>
+          <a:effectRef idx="0">
+            <a:schemeClr val="accent1"/>
+          </a:effectRef>
+          <a:fontRef idx="minor">
+            <a:schemeClr val="lt1"/>
+          </a:fontRef>
+        </p:style>
+        <p:txBody>
+          <a:bodyPr rtlCol="0" anchor="ctr"/>
+          <a:lstStyle/>
+          <a:p>
+            <a:pPr algn="ctr"/>
+            <a:r>
+              <a:rPr lang="zh-TW" altLang="en-US" dirty="0" smtClean="0">
+                <a:solidFill>
+                  <a:srgbClr val="FF0000"/>
+                </a:solidFill>
+              </a:rPr>
+              <a:t>找出對的點</a:t>
+            </a:r>
+            <a:endParaRPr lang="zh-TW" altLang="en-US" dirty="0">
+              <a:solidFill>
+                <a:srgbClr val="FF0000"/>
+              </a:solidFill>
+            </a:endParaRPr>
+          </a:p>
+        </p:txBody>
+      </p:sp>
+      <p:sp>
+        <p:nvSpPr>
+          <p:cNvPr id="34" name="矩形 33"/>
+          <p:cNvSpPr/>
+          <p:nvPr/>
+        </p:nvSpPr>
+        <p:spPr>
+          <a:xfrm>
+            <a:off x="6930786" y="4674526"/>
+            <a:ext cx="1760562" cy="750627"/>
+          </a:xfrm>
+          <a:prstGeom prst="rect">
+            <a:avLst/>
+          </a:prstGeom>
+          <a:noFill/>
+        </p:spPr>
+        <p:style>
+          <a:lnRef idx="2">
+            <a:schemeClr val="accent1">
+              <a:shade val="50000"/>
+            </a:schemeClr>
+          </a:lnRef>
+          <a:fillRef idx="1">
+            <a:schemeClr val="accent1"/>
+          </a:fillRef>
+          <a:effectRef idx="0">
+            <a:schemeClr val="accent1"/>
+          </a:effectRef>
+          <a:fontRef idx="minor">
+            <a:schemeClr val="lt1"/>
+          </a:fontRef>
+        </p:style>
+        <p:txBody>
+          <a:bodyPr rtlCol="0" anchor="ctr"/>
+          <a:lstStyle/>
+          <a:p>
+            <a:pPr algn="ctr"/>
+            <a:r>
+              <a:rPr lang="en-US" altLang="zh-TW" dirty="0" smtClean="0">
+                <a:solidFill>
+                  <a:srgbClr val="FF0000"/>
+                </a:solidFill>
+              </a:rPr>
+              <a:t>cost</a:t>
+            </a:r>
+            <a:endParaRPr lang="zh-TW" altLang="en-US" dirty="0">
+              <a:solidFill>
+                <a:srgbClr val="FF0000"/>
+              </a:solidFill>
+            </a:endParaRPr>
+          </a:p>
+        </p:txBody>
+      </p:sp>
+      <p:cxnSp>
+        <p:nvCxnSpPr>
+          <p:cNvPr id="36" name="直線單箭頭接點 35"/>
+          <p:cNvCxnSpPr>
+            <a:stCxn id="32" idx="1"/>
+            <a:endCxn id="34" idx="3"/>
+          </p:cNvCxnSpPr>
+          <p:nvPr/>
+        </p:nvCxnSpPr>
+        <p:spPr>
+          <a:xfrm flipH="1">
+            <a:off x="8691348" y="5049840"/>
+            <a:ext cx="1506478" cy="0"/>
+          </a:xfrm>
+          <a:prstGeom prst="straightConnector1">
+            <a:avLst/>
+          </a:prstGeom>
+          <a:ln>
+            <a:tailEnd type="triangle"/>
+          </a:ln>
+        </p:spPr>
+        <p:style>
+          <a:lnRef idx="1">
+            <a:schemeClr val="accent1"/>
+          </a:lnRef>
+          <a:fillRef idx="0">
+            <a:schemeClr val="accent1"/>
+          </a:fillRef>
+          <a:effectRef idx="0">
+            <a:schemeClr val="accent1"/>
+          </a:effectRef>
+          <a:fontRef idx="minor">
+            <a:schemeClr val="tx1"/>
+          </a:fontRef>
+        </p:style>
+      </p:cxnSp>
+      <p:sp>
+        <p:nvSpPr>
+          <p:cNvPr id="37" name="文字方塊 36"/>
+          <p:cNvSpPr txBox="1"/>
+          <p:nvPr/>
+        </p:nvSpPr>
+        <p:spPr>
+          <a:xfrm>
+            <a:off x="8632291" y="4449674"/>
+            <a:ext cx="1800493" cy="1477328"/>
+          </a:xfrm>
+          <a:prstGeom prst="rect">
+            <a:avLst/>
+          </a:prstGeom>
+          <a:noFill/>
+        </p:spPr>
+        <p:txBody>
+          <a:bodyPr wrap="none" rtlCol="0">
+            <a:spAutoFit/>
+          </a:bodyPr>
+          <a:lstStyle/>
+          <a:p>
+            <a:r>
+              <a:rPr lang="zh-TW" altLang="en-US" dirty="0" smtClean="0"/>
+              <a:t>將第一張圖錯</a:t>
+            </a:r>
+            <a:endParaRPr lang="en-US" altLang="zh-TW" dirty="0" smtClean="0"/>
+          </a:p>
+          <a:p>
+            <a:r>
+              <a:rPr lang="zh-TW" altLang="en-US" dirty="0" smtClean="0"/>
+              <a:t>的點乘上最好</a:t>
+            </a:r>
+            <a:endParaRPr lang="en-US" altLang="zh-TW" dirty="0" smtClean="0"/>
+          </a:p>
+          <a:p>
+            <a:r>
+              <a:rPr lang="zh-TW" altLang="en-US" dirty="0" smtClean="0"/>
+              <a:t>的轉換矩陣，</a:t>
+            </a:r>
+            <a:endParaRPr lang="en-US" altLang="zh-TW" dirty="0" smtClean="0"/>
+          </a:p>
+          <a:p>
+            <a:r>
+              <a:rPr lang="zh-TW" altLang="en-US" dirty="0" smtClean="0"/>
+              <a:t>在減去第二張的</a:t>
+            </a:r>
+            <a:endParaRPr lang="en-US" altLang="zh-TW" dirty="0" smtClean="0"/>
+          </a:p>
+          <a:p>
+            <a:r>
+              <a:rPr lang="zh-TW" altLang="en-US" dirty="0" smtClean="0"/>
+              <a:t>錯</a:t>
+            </a:r>
+            <a:r>
+              <a:rPr lang="zh-TW" altLang="en-US" dirty="0"/>
+              <a:t>的</a:t>
+            </a:r>
+            <a:r>
+              <a:rPr lang="zh-TW" altLang="en-US" dirty="0" smtClean="0"/>
+              <a:t>點，算</a:t>
+            </a:r>
+            <a:r>
+              <a:rPr lang="en-US" altLang="zh-TW" dirty="0" smtClean="0"/>
+              <a:t>cost</a:t>
+            </a:r>
+            <a:endParaRPr lang="zh-TW" altLang="en-US" dirty="0"/>
+          </a:p>
+        </p:txBody>
+      </p:sp>
+      <p:sp>
+        <p:nvSpPr>
+          <p:cNvPr id="40" name="矩形 39"/>
+          <p:cNvSpPr/>
+          <p:nvPr/>
+        </p:nvSpPr>
+        <p:spPr>
+          <a:xfrm>
+            <a:off x="3455157" y="4674526"/>
+            <a:ext cx="1760562" cy="750627"/>
+          </a:xfrm>
+          <a:prstGeom prst="rect">
+            <a:avLst/>
+          </a:prstGeom>
+          <a:noFill/>
+        </p:spPr>
+        <p:style>
+          <a:lnRef idx="2">
+            <a:schemeClr val="accent1">
+              <a:shade val="50000"/>
+            </a:schemeClr>
+          </a:lnRef>
+          <a:fillRef idx="1">
+            <a:schemeClr val="accent1"/>
+          </a:fillRef>
+          <a:effectRef idx="0">
+            <a:schemeClr val="accent1"/>
+          </a:effectRef>
+          <a:fontRef idx="minor">
+            <a:schemeClr val="lt1"/>
+          </a:fontRef>
+        </p:style>
+        <p:txBody>
+          <a:bodyPr rtlCol="0" anchor="ctr"/>
+          <a:lstStyle/>
+          <a:p>
+            <a:pPr algn="ctr"/>
+            <a:r>
+              <a:rPr lang="zh-TW" altLang="en-US" dirty="0" smtClean="0">
+                <a:solidFill>
+                  <a:srgbClr val="FF0000"/>
+                </a:solidFill>
+              </a:rPr>
+              <a:t>找出剩下點的最佳對應</a:t>
+            </a:r>
+            <a:r>
+              <a:rPr lang="zh-TW" altLang="en-US" dirty="0">
+                <a:solidFill>
+                  <a:srgbClr val="FF0000"/>
+                </a:solidFill>
+              </a:rPr>
+              <a:t>點</a:t>
+            </a:r>
+          </a:p>
+        </p:txBody>
+      </p:sp>
+      <p:cxnSp>
+        <p:nvCxnSpPr>
+          <p:cNvPr id="42" name="直線單箭頭接點 41"/>
+          <p:cNvCxnSpPr>
+            <a:stCxn id="34" idx="1"/>
+            <a:endCxn id="40" idx="3"/>
+          </p:cNvCxnSpPr>
+          <p:nvPr/>
+        </p:nvCxnSpPr>
+        <p:spPr>
+          <a:xfrm flipH="1">
+            <a:off x="5215719" y="5049840"/>
+            <a:ext cx="1715067" cy="0"/>
+          </a:xfrm>
+          <a:prstGeom prst="straightConnector1">
+            <a:avLst/>
+          </a:prstGeom>
+          <a:ln>
+            <a:tailEnd type="triangle"/>
+          </a:ln>
+        </p:spPr>
+        <p:style>
+          <a:lnRef idx="1">
+            <a:schemeClr val="accent1"/>
+          </a:lnRef>
+          <a:fillRef idx="0">
+            <a:schemeClr val="accent1"/>
+          </a:fillRef>
+          <a:effectRef idx="0">
+            <a:schemeClr val="accent1"/>
+          </a:effectRef>
+          <a:fontRef idx="minor">
+            <a:schemeClr val="tx1"/>
+          </a:fontRef>
+        </p:style>
+      </p:cxnSp>
+      <p:sp>
+        <p:nvSpPr>
+          <p:cNvPr id="44" name="文字方塊 43"/>
+          <p:cNvSpPr txBox="1"/>
+          <p:nvPr/>
+        </p:nvSpPr>
+        <p:spPr>
+          <a:xfrm>
+            <a:off x="5426586" y="4726673"/>
+            <a:ext cx="1338828" cy="646331"/>
+          </a:xfrm>
+          <a:prstGeom prst="rect">
+            <a:avLst/>
+          </a:prstGeom>
+          <a:noFill/>
+        </p:spPr>
+        <p:txBody>
+          <a:bodyPr wrap="none" rtlCol="0">
+            <a:spAutoFit/>
+          </a:bodyPr>
+          <a:lstStyle/>
+          <a:p>
+            <a:r>
+              <a:rPr lang="zh-TW" altLang="en-US" dirty="0" smtClean="0"/>
+              <a:t>透過匈牙利</a:t>
+            </a:r>
+            <a:endParaRPr lang="en-US" altLang="zh-TW" dirty="0" smtClean="0"/>
+          </a:p>
+          <a:p>
+            <a:r>
+              <a:rPr lang="zh-TW" altLang="en-US" dirty="0" smtClean="0"/>
+              <a:t>演算法</a:t>
+            </a:r>
+            <a:endParaRPr lang="zh-TW" altLang="en-US" dirty="0"/>
+          </a:p>
+        </p:txBody>
+      </p:sp>
+      <p:sp>
+        <p:nvSpPr>
+          <p:cNvPr id="45" name="矩形 44"/>
+          <p:cNvSpPr/>
+          <p:nvPr/>
+        </p:nvSpPr>
+        <p:spPr>
+          <a:xfrm>
+            <a:off x="61075" y="4617826"/>
+            <a:ext cx="1760562" cy="750627"/>
+          </a:xfrm>
+          <a:prstGeom prst="rect">
+            <a:avLst/>
+          </a:prstGeom>
+          <a:noFill/>
+        </p:spPr>
+        <p:style>
+          <a:lnRef idx="2">
+            <a:schemeClr val="accent1">
+              <a:shade val="50000"/>
+            </a:schemeClr>
+          </a:lnRef>
+          <a:fillRef idx="1">
+            <a:schemeClr val="accent1"/>
+          </a:fillRef>
+          <a:effectRef idx="0">
+            <a:schemeClr val="accent1"/>
+          </a:effectRef>
+          <a:fontRef idx="minor">
+            <a:schemeClr val="lt1"/>
+          </a:fontRef>
+        </p:style>
+        <p:txBody>
+          <a:bodyPr rtlCol="0" anchor="ctr"/>
+          <a:lstStyle/>
+          <a:p>
+            <a:pPr algn="ctr"/>
+            <a:r>
+              <a:rPr lang="zh-TW" altLang="en-US" dirty="0" smtClean="0">
+                <a:solidFill>
+                  <a:srgbClr val="FF0000"/>
+                </a:solidFill>
+              </a:rPr>
+              <a:t>找出對的點</a:t>
+            </a:r>
+            <a:endParaRPr lang="zh-TW" altLang="en-US" dirty="0">
+              <a:solidFill>
+                <a:srgbClr val="FF0000"/>
+              </a:solidFill>
+            </a:endParaRPr>
+          </a:p>
+        </p:txBody>
+      </p:sp>
+      <p:cxnSp>
+        <p:nvCxnSpPr>
+          <p:cNvPr id="47" name="直線單箭頭接點 46"/>
+          <p:cNvCxnSpPr>
+            <a:stCxn id="40" idx="1"/>
+            <a:endCxn id="45" idx="3"/>
+          </p:cNvCxnSpPr>
+          <p:nvPr/>
+        </p:nvCxnSpPr>
+        <p:spPr>
+          <a:xfrm flipH="1" flipV="1">
+            <a:off x="1821637" y="4993140"/>
+            <a:ext cx="1633520" cy="56700"/>
+          </a:xfrm>
+          <a:prstGeom prst="straightConnector1">
+            <a:avLst/>
+          </a:prstGeom>
+          <a:ln>
+            <a:tailEnd type="triangle"/>
+          </a:ln>
+        </p:spPr>
+        <p:style>
+          <a:lnRef idx="1">
+            <a:schemeClr val="accent1"/>
+          </a:lnRef>
+          <a:fillRef idx="0">
+            <a:schemeClr val="accent1"/>
+          </a:fillRef>
+          <a:effectRef idx="0">
+            <a:schemeClr val="accent1"/>
+          </a:effectRef>
+          <a:fontRef idx="minor">
+            <a:schemeClr val="tx1"/>
+          </a:fontRef>
+        </p:style>
+      </p:cxnSp>
+      <p:sp>
+        <p:nvSpPr>
+          <p:cNvPr id="48" name="文字方塊 47"/>
+          <p:cNvSpPr txBox="1"/>
+          <p:nvPr/>
+        </p:nvSpPr>
+        <p:spPr>
+          <a:xfrm>
+            <a:off x="1832634" y="4669973"/>
+            <a:ext cx="1828800" cy="923330"/>
+          </a:xfrm>
+          <a:prstGeom prst="rect">
+            <a:avLst/>
+          </a:prstGeom>
+          <a:noFill/>
+        </p:spPr>
+        <p:txBody>
+          <a:bodyPr wrap="square" rtlCol="0">
+            <a:spAutoFit/>
+          </a:bodyPr>
+          <a:lstStyle/>
+          <a:p>
+            <a:r>
+              <a:rPr lang="zh-TW" altLang="en-US" dirty="0" smtClean="0"/>
+              <a:t>設</a:t>
+            </a:r>
+            <a:r>
+              <a:rPr lang="en-US" altLang="zh-TW" dirty="0" smtClean="0"/>
+              <a:t>threshold=0.1</a:t>
+            </a:r>
+          </a:p>
+          <a:p>
+            <a:r>
+              <a:rPr lang="zh-TW" altLang="en-US" dirty="0" smtClean="0"/>
+              <a:t>將好的點留下，不好的</a:t>
+            </a:r>
+            <a:r>
+              <a:rPr lang="zh-TW" altLang="en-US" dirty="0"/>
+              <a:t>刪除</a:t>
+            </a:r>
+          </a:p>
+        </p:txBody>
+      </p:sp>
+    </p:spTree>
+    <p:extLst>
+      <p:ext uri="{BB962C8B-B14F-4D97-AF65-F5344CB8AC3E}">
+        <p14:creationId xmlns:p14="http://schemas.microsoft.com/office/powerpoint/2010/main" val="1948764384"/>
+      </p:ext>
+    </p:extLst>
+  </p:cSld>
+  <p:clrMapOvr>
+    <a:masterClrMapping/>
+  </p:clrMapOvr>
 </p:sld>
 </file>
 

</xml_diff>